<commit_message>
Modificato il file (presentazione) e aggiunti file con estensione jpg dei prototipi creati da photoshop"
git status

\n
\0
exit
dio
cantante
stop
kill
cristo
di merda
?
</commit_message>
<xml_diff>
--- a/mockup/presentazione.pptx
+++ b/mockup/presentazione.pptx
@@ -108,6 +108,11 @@
       </a:defRPr>
     </a:lvl9pPr>
   </p:defaultTextStyle>
+  <p:extLst>
+    <p:ext uri="{EFAFB233-063F-42B5-8137-9DF3F51BA10A}">
+      <p15:sldGuideLst xmlns:p15="http://schemas.microsoft.com/office/powerpoint/2012/main"/>
+    </p:ext>
+  </p:extLst>
 </p:presentation>
 </file>
 
@@ -242,7 +247,7 @@
           <a:p>
             <a:fld id="{AC1E7671-E8C1-4C57-B64D-652DD43A332D}" type="datetimeFigureOut">
               <a:rPr lang="it-IT" smtClean="0"/>
-              <a:t>18/10/2018</a:t>
+              <a:t>19/10/2018</a:t>
             </a:fld>
             <a:endParaRPr lang="it-IT"/>
           </a:p>
@@ -412,7 +417,7 @@
           <a:p>
             <a:fld id="{AC1E7671-E8C1-4C57-B64D-652DD43A332D}" type="datetimeFigureOut">
               <a:rPr lang="it-IT" smtClean="0"/>
-              <a:t>18/10/2018</a:t>
+              <a:t>19/10/2018</a:t>
             </a:fld>
             <a:endParaRPr lang="it-IT"/>
           </a:p>
@@ -592,7 +597,7 @@
           <a:p>
             <a:fld id="{AC1E7671-E8C1-4C57-B64D-652DD43A332D}" type="datetimeFigureOut">
               <a:rPr lang="it-IT" smtClean="0"/>
-              <a:t>18/10/2018</a:t>
+              <a:t>19/10/2018</a:t>
             </a:fld>
             <a:endParaRPr lang="it-IT"/>
           </a:p>
@@ -762,7 +767,7 @@
           <a:p>
             <a:fld id="{AC1E7671-E8C1-4C57-B64D-652DD43A332D}" type="datetimeFigureOut">
               <a:rPr lang="it-IT" smtClean="0"/>
-              <a:t>18/10/2018</a:t>
+              <a:t>19/10/2018</a:t>
             </a:fld>
             <a:endParaRPr lang="it-IT"/>
           </a:p>
@@ -1008,7 +1013,7 @@
           <a:p>
             <a:fld id="{AC1E7671-E8C1-4C57-B64D-652DD43A332D}" type="datetimeFigureOut">
               <a:rPr lang="it-IT" smtClean="0"/>
-              <a:t>18/10/2018</a:t>
+              <a:t>19/10/2018</a:t>
             </a:fld>
             <a:endParaRPr lang="it-IT"/>
           </a:p>
@@ -1240,7 +1245,7 @@
           <a:p>
             <a:fld id="{AC1E7671-E8C1-4C57-B64D-652DD43A332D}" type="datetimeFigureOut">
               <a:rPr lang="it-IT" smtClean="0"/>
-              <a:t>18/10/2018</a:t>
+              <a:t>19/10/2018</a:t>
             </a:fld>
             <a:endParaRPr lang="it-IT"/>
           </a:p>
@@ -1607,7 +1612,7 @@
           <a:p>
             <a:fld id="{AC1E7671-E8C1-4C57-B64D-652DD43A332D}" type="datetimeFigureOut">
               <a:rPr lang="it-IT" smtClean="0"/>
-              <a:t>18/10/2018</a:t>
+              <a:t>19/10/2018</a:t>
             </a:fld>
             <a:endParaRPr lang="it-IT"/>
           </a:p>
@@ -1725,7 +1730,7 @@
           <a:p>
             <a:fld id="{AC1E7671-E8C1-4C57-B64D-652DD43A332D}" type="datetimeFigureOut">
               <a:rPr lang="it-IT" smtClean="0"/>
-              <a:t>18/10/2018</a:t>
+              <a:t>19/10/2018</a:t>
             </a:fld>
             <a:endParaRPr lang="it-IT"/>
           </a:p>
@@ -1820,7 +1825,7 @@
           <a:p>
             <a:fld id="{AC1E7671-E8C1-4C57-B64D-652DD43A332D}" type="datetimeFigureOut">
               <a:rPr lang="it-IT" smtClean="0"/>
-              <a:t>18/10/2018</a:t>
+              <a:t>19/10/2018</a:t>
             </a:fld>
             <a:endParaRPr lang="it-IT"/>
           </a:p>
@@ -2097,7 +2102,7 @@
           <a:p>
             <a:fld id="{AC1E7671-E8C1-4C57-B64D-652DD43A332D}" type="datetimeFigureOut">
               <a:rPr lang="it-IT" smtClean="0"/>
-              <a:t>18/10/2018</a:t>
+              <a:t>19/10/2018</a:t>
             </a:fld>
             <a:endParaRPr lang="it-IT"/>
           </a:p>
@@ -2354,7 +2359,7 @@
           <a:p>
             <a:fld id="{AC1E7671-E8C1-4C57-B64D-652DD43A332D}" type="datetimeFigureOut">
               <a:rPr lang="it-IT" smtClean="0"/>
-              <a:t>18/10/2018</a:t>
+              <a:t>19/10/2018</a:t>
             </a:fld>
             <a:endParaRPr lang="it-IT"/>
           </a:p>
@@ -2567,7 +2572,7 @@
           <a:p>
             <a:fld id="{AC1E7671-E8C1-4C57-B64D-652DD43A332D}" type="datetimeFigureOut">
               <a:rPr lang="it-IT" smtClean="0"/>
-              <a:t>18/10/2018</a:t>
+              <a:t>19/10/2018</a:t>
             </a:fld>
             <a:endParaRPr lang="it-IT"/>
           </a:p>
@@ -3205,7 +3210,7 @@
             </a:pPr>
             <a:r>
               <a:rPr lang="it-IT" sz="2400" dirty="0"/>
-              <a:t>Con l’intenzione di rivolgersi a privati e professionisti che abbiano bisogno di utilizzare un determinato bene per un breve arco di tempo, evitandone così l’acquisto</a:t>
+              <a:t>Intenzione di rivolgersi a privati e professionisti che abbiano bisogno di utilizzare un determinato bene per un breve arco di tempo, evitandone così l’acquisto</a:t>
             </a:r>
           </a:p>
           <a:p>
@@ -3249,49 +3254,6 @@
       </p:grpSpPr>
       <p:sp>
         <p:nvSpPr>
-          <p:cNvPr id="4" name="CasellaDiTesto 3">
-            <a:extLst>
-              <a:ext uri="{FF2B5EF4-FFF2-40B4-BE49-F238E27FC236}">
-                <a16:creationId xmlns:a16="http://schemas.microsoft.com/office/drawing/2014/main" id="{104027CC-F260-4C9A-B958-96424E1E8543}"/>
-              </a:ext>
-            </a:extLst>
-          </p:cNvPr>
-          <p:cNvSpPr txBox="1"/>
-          <p:nvPr/>
-        </p:nvSpPr>
-        <p:spPr>
-          <a:xfrm>
-            <a:off x="1076632" y="2514600"/>
-            <a:ext cx="2396613" cy="1200329"/>
-          </a:xfrm>
-          <a:prstGeom prst="rect">
-            <a:avLst/>
-          </a:prstGeom>
-          <a:noFill/>
-        </p:spPr>
-        <p:txBody>
-          <a:bodyPr wrap="square" rtlCol="0">
-            <a:spAutoFit/>
-          </a:bodyPr>
-          <a:lstStyle/>
-          <a:p>
-            <a:r>
-              <a:rPr lang="it-IT" sz="2400" dirty="0"/>
-              <a:t>Inserire immagine del feed </a:t>
-            </a:r>
-            <a:endParaRPr lang="it-IT" sz="2400" kern="1200" dirty="0">
-              <a:solidFill>
-                <a:schemeClr val="tx1"/>
-              </a:solidFill>
-              <a:latin typeface="+mn-lt"/>
-              <a:ea typeface="+mn-ea"/>
-              <a:cs typeface="+mn-cs"/>
-            </a:endParaRPr>
-          </a:p>
-        </p:txBody>
-      </p:sp>
-      <p:sp>
-        <p:nvSpPr>
           <p:cNvPr id="5" name="CasellaDiTesto 4">
             <a:extLst>
               <a:ext uri="{FF2B5EF4-FFF2-40B4-BE49-F238E27FC236}">
@@ -3304,8 +3266,8 @@
         </p:nvSpPr>
         <p:spPr>
           <a:xfrm>
-            <a:off x="7112410" y="2514600"/>
-            <a:ext cx="1828800" cy="1569660"/>
+            <a:off x="5013315" y="352245"/>
+            <a:ext cx="6494323" cy="5632311"/>
           </a:xfrm>
           <a:prstGeom prst="rect">
             <a:avLst/>
@@ -3318,21 +3280,125 @@
           </a:bodyPr>
           <a:lstStyle/>
           <a:p>
+            <a:pPr marL="342900" indent="-342900">
+              <a:buFont typeface="Arial" panose="020B0604020202020204" pitchFamily="34" charset="0"/>
+              <a:buChar char="•"/>
+            </a:pPr>
+            <a:r>
+              <a:rPr lang="it-IT" sz="2400" kern="1200" dirty="0">
+                <a:solidFill>
+                  <a:schemeClr val="tx1"/>
+                </a:solidFill>
+                <a:latin typeface="+mn-lt"/>
+                <a:ea typeface="+mn-ea"/>
+                <a:cs typeface="+mn-cs"/>
+              </a:rPr>
+              <a:t>L’applicazione funziona con un feed di annunci contenenti le specifiche, il prezzo giornaliero del prodotto e la persona o società che affitta il bene</a:t>
+            </a:r>
+          </a:p>
+          <a:p>
+            <a:pPr marL="342900" indent="-342900">
+              <a:buFont typeface="Arial" panose="020B0604020202020204" pitchFamily="34" charset="0"/>
+              <a:buChar char="•"/>
+            </a:pPr>
+            <a:endParaRPr lang="it-IT" sz="2400" dirty="0"/>
+          </a:p>
+          <a:p>
+            <a:pPr marL="342900" indent="-342900">
+              <a:buFont typeface="Arial" panose="020B0604020202020204" pitchFamily="34" charset="0"/>
+              <a:buChar char="•"/>
+            </a:pPr>
             <a:r>
               <a:rPr lang="it-IT" sz="2400" dirty="0"/>
-              <a:t>Applicazione funziona con un feed di annunci </a:t>
-            </a:r>
-            <a:endParaRPr lang="it-IT" sz="2400" kern="1200" dirty="0">
-              <a:solidFill>
-                <a:schemeClr val="tx1"/>
-              </a:solidFill>
-              <a:latin typeface="+mn-lt"/>
-              <a:ea typeface="+mn-ea"/>
-              <a:cs typeface="+mn-cs"/>
-            </a:endParaRPr>
-          </a:p>
-        </p:txBody>
-      </p:sp>
+              <a:t>Nella barra in alto è possibile eseguire ricerche di oggetti specifici</a:t>
+            </a:r>
+          </a:p>
+          <a:p>
+            <a:pPr marL="342900" indent="-342900">
+              <a:buFont typeface="Arial" panose="020B0604020202020204" pitchFamily="34" charset="0"/>
+              <a:buChar char="•"/>
+            </a:pPr>
+            <a:endParaRPr lang="it-IT" sz="2400" dirty="0"/>
+          </a:p>
+          <a:p>
+            <a:pPr marL="342900" indent="-342900">
+              <a:buFont typeface="Arial" panose="020B0604020202020204" pitchFamily="34" charset="0"/>
+              <a:buChar char="•"/>
+            </a:pPr>
+            <a:r>
+              <a:rPr lang="it-IT" sz="2400" dirty="0"/>
+              <a:t>Il pallino in alto a destra di colore rosso segnala eventuali notifiche</a:t>
+            </a:r>
+          </a:p>
+          <a:p>
+            <a:pPr marL="342900" indent="-342900">
+              <a:buFont typeface="Arial" panose="020B0604020202020204" pitchFamily="34" charset="0"/>
+              <a:buChar char="•"/>
+            </a:pPr>
+            <a:endParaRPr lang="it-IT" sz="2400" dirty="0"/>
+          </a:p>
+          <a:p>
+            <a:pPr marL="342900" indent="-342900">
+              <a:buFont typeface="Arial" panose="020B0604020202020204" pitchFamily="34" charset="0"/>
+              <a:buChar char="•"/>
+            </a:pPr>
+            <a:r>
+              <a:rPr lang="it-IT" sz="2400" dirty="0"/>
+              <a:t>È possibile aprire un menù a tendina nella parte sinistra dello schermo </a:t>
+            </a:r>
+          </a:p>
+          <a:p>
+            <a:pPr marL="342900" indent="-342900">
+              <a:buFont typeface="Arial" panose="020B0604020202020204" pitchFamily="34" charset="0"/>
+              <a:buChar char="•"/>
+            </a:pPr>
+            <a:endParaRPr lang="it-IT" sz="2400" dirty="0"/>
+          </a:p>
+          <a:p>
+            <a:pPr marL="342900" indent="-342900">
+              <a:buFont typeface="Arial" panose="020B0604020202020204" pitchFamily="34" charset="0"/>
+              <a:buChar char="•"/>
+            </a:pPr>
+            <a:endParaRPr lang="it-IT" sz="2400" dirty="0"/>
+          </a:p>
+        </p:txBody>
+      </p:sp>
+      <p:pic>
+        <p:nvPicPr>
+          <p:cNvPr id="3" name="Immagine 2">
+            <a:extLst>
+              <a:ext uri="{FF2B5EF4-FFF2-40B4-BE49-F238E27FC236}">
+                <a16:creationId xmlns:a16="http://schemas.microsoft.com/office/drawing/2014/main" id="{B17ED424-E68E-4E57-A236-DFC3C0F0D140}"/>
+              </a:ext>
+            </a:extLst>
+          </p:cNvPr>
+          <p:cNvPicPr>
+            <a:picLocks noChangeAspect="1"/>
+          </p:cNvPicPr>
+          <p:nvPr/>
+        </p:nvPicPr>
+        <p:blipFill>
+          <a:blip r:embed="rId2">
+            <a:extLst>
+              <a:ext uri="{28A0092B-C50C-407E-A947-70E740481C1C}">
+                <a14:useLocalDpi xmlns:a14="http://schemas.microsoft.com/office/drawing/2010/main" val="0"/>
+              </a:ext>
+            </a:extLst>
+          </a:blip>
+          <a:stretch>
+            <a:fillRect/>
+          </a:stretch>
+        </p:blipFill>
+        <p:spPr>
+          <a:xfrm>
+            <a:off x="212694" y="201283"/>
+            <a:ext cx="3631182" cy="6455434"/>
+          </a:xfrm>
+          <a:prstGeom prst="rect">
+            <a:avLst/>
+          </a:prstGeom>
+        </p:spPr>
+      </p:pic>
     </p:spTree>
     <p:extLst>
       <p:ext uri="{BB962C8B-B14F-4D97-AF65-F5344CB8AC3E}">
@@ -3365,39 +3431,6 @@
       </p:grpSpPr>
       <p:sp>
         <p:nvSpPr>
-          <p:cNvPr id="2" name="Titolo 1">
-            <a:extLst>
-              <a:ext uri="{FF2B5EF4-FFF2-40B4-BE49-F238E27FC236}">
-                <a16:creationId xmlns:a16="http://schemas.microsoft.com/office/drawing/2014/main" id="{7DE1DAEC-43C3-4617-BBF8-A2AFBE34FABF}"/>
-              </a:ext>
-            </a:extLst>
-          </p:cNvPr>
-          <p:cNvSpPr>
-            <a:spLocks noGrp="1"/>
-          </p:cNvSpPr>
-          <p:nvPr>
-            <p:ph type="title"/>
-          </p:nvPr>
-        </p:nvSpPr>
-        <p:spPr>
-          <a:xfrm>
-            <a:off x="720213" y="1640860"/>
-            <a:ext cx="4412226" cy="3698056"/>
-          </a:xfrm>
-        </p:spPr>
-        <p:txBody>
-          <a:bodyPr/>
-          <a:lstStyle/>
-          <a:p>
-            <a:r>
-              <a:rPr lang="it-IT" dirty="0"/>
-              <a:t>Immagine con tendina aperta </a:t>
-            </a:r>
-          </a:p>
-        </p:txBody>
-      </p:sp>
-      <p:sp>
-        <p:nvSpPr>
           <p:cNvPr id="3" name="Segnaposto contenuto 2">
             <a:extLst>
               <a:ext uri="{FF2B5EF4-FFF2-40B4-BE49-F238E27FC236}">
@@ -3414,46 +3447,89 @@
         </p:nvSpPr>
         <p:spPr>
           <a:xfrm>
-            <a:off x="6813754" y="1825625"/>
-            <a:ext cx="4540045" cy="3616530"/>
+            <a:off x="4950447" y="150003"/>
+            <a:ext cx="6902247" cy="6429076"/>
           </a:xfrm>
         </p:spPr>
         <p:txBody>
-          <a:bodyPr/>
-          <a:lstStyle/>
+          <a:bodyPr>
+            <a:normAutofit/>
+          </a:bodyPr>
+          <a:lstStyle/>
+          <a:p>
+            <a:endParaRPr lang="it-IT" dirty="0"/>
+          </a:p>
           <a:p>
             <a:r>
               <a:rPr lang="it-IT" dirty="0"/>
-              <a:t>Utente</a:t>
+              <a:t>Il menù a tendina mostra gli annunci dell’utente</a:t>
             </a:r>
           </a:p>
           <a:p>
             <a:r>
               <a:rPr lang="it-IT" dirty="0"/>
-              <a:t>Osservati</a:t>
+              <a:t>La sezione messaggi visualizza eventuali messaggi da altri utenti </a:t>
             </a:r>
           </a:p>
           <a:p>
             <a:r>
               <a:rPr lang="it-IT" dirty="0"/>
-              <a:t>Renting list </a:t>
-            </a:r>
-          </a:p>
-          <a:p>
-            <a:r>
-              <a:rPr lang="it-IT"/>
-              <a:t>Categorie ˅</a:t>
-            </a:r>
+              <a:t>Sarà offerta la possibilità di selezionare dei preferiti e quindi di visualizzarli</a:t>
+            </a:r>
+          </a:p>
+          <a:p>
+            <a:r>
+              <a:rPr lang="it-IT" dirty="0"/>
+              <a:t>Tramite impostazioni è possibile modificare la lingua dell’applicazione e(…)</a:t>
+            </a:r>
+          </a:p>
+          <a:p>
+            <a:r>
+              <a:rPr lang="it-IT" dirty="0"/>
+              <a:t>Sotto la voce categorie sono mostrate diverse opzioni che portano a oggetti di una determinata categoria o a oggetti più gettonati (Chi ne ha più ne metta)</a:t>
+            </a:r>
+          </a:p>
+          <a:p>
             <a:endParaRPr lang="it-IT" dirty="0"/>
           </a:p>
-          <a:p>
-            <a:r>
-              <a:rPr lang="it-IT" dirty="0"/>
-              <a:t>Impostazioni (lingua…)</a:t>
-            </a:r>
-          </a:p>
-        </p:txBody>
-      </p:sp>
+        </p:txBody>
+      </p:sp>
+      <p:pic>
+        <p:nvPicPr>
+          <p:cNvPr id="7" name="Immagine 6">
+            <a:extLst>
+              <a:ext uri="{FF2B5EF4-FFF2-40B4-BE49-F238E27FC236}">
+                <a16:creationId xmlns:a16="http://schemas.microsoft.com/office/drawing/2014/main" id="{E19E189E-4AED-4749-A89A-B6888B493571}"/>
+              </a:ext>
+            </a:extLst>
+          </p:cNvPr>
+          <p:cNvPicPr>
+            <a:picLocks noChangeAspect="1"/>
+          </p:cNvPicPr>
+          <p:nvPr/>
+        </p:nvPicPr>
+        <p:blipFill>
+          <a:blip r:embed="rId2">
+            <a:extLst>
+              <a:ext uri="{28A0092B-C50C-407E-A947-70E740481C1C}">
+                <a14:useLocalDpi xmlns:a14="http://schemas.microsoft.com/office/drawing/2010/main" val="0"/>
+              </a:ext>
+            </a:extLst>
+          </a:blip>
+          <a:stretch>
+            <a:fillRect/>
+          </a:stretch>
+        </p:blipFill>
+        <p:spPr>
+          <a:xfrm>
+            <a:off x="208021" y="214462"/>
+            <a:ext cx="3616355" cy="6429076"/>
+          </a:xfrm>
+          <a:prstGeom prst="rect">
+            <a:avLst/>
+          </a:prstGeom>
+        </p:spPr>
+      </p:pic>
     </p:spTree>
     <p:extLst>
       <p:ext uri="{BB962C8B-B14F-4D97-AF65-F5344CB8AC3E}">

</xml_diff>

<commit_message>
Aggiustato un piccolo errore di battitura
</commit_message>
<xml_diff>
--- a/mockup/presentazione.pptx
+++ b/mockup/presentazione.pptx
@@ -247,7 +247,7 @@
           <a:p>
             <a:fld id="{AC1E7671-E8C1-4C57-B64D-652DD43A332D}" type="datetimeFigureOut">
               <a:rPr lang="it-IT" smtClean="0"/>
-              <a:t>19/10/2018</a:t>
+              <a:t>20/10/2018</a:t>
             </a:fld>
             <a:endParaRPr lang="it-IT"/>
           </a:p>
@@ -289,7 +289,7 @@
           <a:p>
             <a:fld id="{0914D3B2-4EE6-476D-8EC9-0B9A2CDA4F7D}" type="slidenum">
               <a:rPr lang="it-IT" smtClean="0"/>
-              <a:t>‹N›</a:t>
+              <a:t>‹#›</a:t>
             </a:fld>
             <a:endParaRPr lang="it-IT"/>
           </a:p>
@@ -417,7 +417,7 @@
           <a:p>
             <a:fld id="{AC1E7671-E8C1-4C57-B64D-652DD43A332D}" type="datetimeFigureOut">
               <a:rPr lang="it-IT" smtClean="0"/>
-              <a:t>19/10/2018</a:t>
+              <a:t>20/10/2018</a:t>
             </a:fld>
             <a:endParaRPr lang="it-IT"/>
           </a:p>
@@ -459,7 +459,7 @@
           <a:p>
             <a:fld id="{0914D3B2-4EE6-476D-8EC9-0B9A2CDA4F7D}" type="slidenum">
               <a:rPr lang="it-IT" smtClean="0"/>
-              <a:t>‹N›</a:t>
+              <a:t>‹#›</a:t>
             </a:fld>
             <a:endParaRPr lang="it-IT"/>
           </a:p>
@@ -597,7 +597,7 @@
           <a:p>
             <a:fld id="{AC1E7671-E8C1-4C57-B64D-652DD43A332D}" type="datetimeFigureOut">
               <a:rPr lang="it-IT" smtClean="0"/>
-              <a:t>19/10/2018</a:t>
+              <a:t>20/10/2018</a:t>
             </a:fld>
             <a:endParaRPr lang="it-IT"/>
           </a:p>
@@ -639,7 +639,7 @@
           <a:p>
             <a:fld id="{0914D3B2-4EE6-476D-8EC9-0B9A2CDA4F7D}" type="slidenum">
               <a:rPr lang="it-IT" smtClean="0"/>
-              <a:t>‹N›</a:t>
+              <a:t>‹#›</a:t>
             </a:fld>
             <a:endParaRPr lang="it-IT"/>
           </a:p>
@@ -767,7 +767,7 @@
           <a:p>
             <a:fld id="{AC1E7671-E8C1-4C57-B64D-652DD43A332D}" type="datetimeFigureOut">
               <a:rPr lang="it-IT" smtClean="0"/>
-              <a:t>19/10/2018</a:t>
+              <a:t>20/10/2018</a:t>
             </a:fld>
             <a:endParaRPr lang="it-IT"/>
           </a:p>
@@ -809,7 +809,7 @@
           <a:p>
             <a:fld id="{0914D3B2-4EE6-476D-8EC9-0B9A2CDA4F7D}" type="slidenum">
               <a:rPr lang="it-IT" smtClean="0"/>
-              <a:t>‹N›</a:t>
+              <a:t>‹#›</a:t>
             </a:fld>
             <a:endParaRPr lang="it-IT"/>
           </a:p>
@@ -1013,7 +1013,7 @@
           <a:p>
             <a:fld id="{AC1E7671-E8C1-4C57-B64D-652DD43A332D}" type="datetimeFigureOut">
               <a:rPr lang="it-IT" smtClean="0"/>
-              <a:t>19/10/2018</a:t>
+              <a:t>20/10/2018</a:t>
             </a:fld>
             <a:endParaRPr lang="it-IT"/>
           </a:p>
@@ -1055,7 +1055,7 @@
           <a:p>
             <a:fld id="{0914D3B2-4EE6-476D-8EC9-0B9A2CDA4F7D}" type="slidenum">
               <a:rPr lang="it-IT" smtClean="0"/>
-              <a:t>‹N›</a:t>
+              <a:t>‹#›</a:t>
             </a:fld>
             <a:endParaRPr lang="it-IT"/>
           </a:p>
@@ -1245,7 +1245,7 @@
           <a:p>
             <a:fld id="{AC1E7671-E8C1-4C57-B64D-652DD43A332D}" type="datetimeFigureOut">
               <a:rPr lang="it-IT" smtClean="0"/>
-              <a:t>19/10/2018</a:t>
+              <a:t>20/10/2018</a:t>
             </a:fld>
             <a:endParaRPr lang="it-IT"/>
           </a:p>
@@ -1287,7 +1287,7 @@
           <a:p>
             <a:fld id="{0914D3B2-4EE6-476D-8EC9-0B9A2CDA4F7D}" type="slidenum">
               <a:rPr lang="it-IT" smtClean="0"/>
-              <a:t>‹N›</a:t>
+              <a:t>‹#›</a:t>
             </a:fld>
             <a:endParaRPr lang="it-IT"/>
           </a:p>
@@ -1612,7 +1612,7 @@
           <a:p>
             <a:fld id="{AC1E7671-E8C1-4C57-B64D-652DD43A332D}" type="datetimeFigureOut">
               <a:rPr lang="it-IT" smtClean="0"/>
-              <a:t>19/10/2018</a:t>
+              <a:t>20/10/2018</a:t>
             </a:fld>
             <a:endParaRPr lang="it-IT"/>
           </a:p>
@@ -1654,7 +1654,7 @@
           <a:p>
             <a:fld id="{0914D3B2-4EE6-476D-8EC9-0B9A2CDA4F7D}" type="slidenum">
               <a:rPr lang="it-IT" smtClean="0"/>
-              <a:t>‹N›</a:t>
+              <a:t>‹#›</a:t>
             </a:fld>
             <a:endParaRPr lang="it-IT"/>
           </a:p>
@@ -1730,7 +1730,7 @@
           <a:p>
             <a:fld id="{AC1E7671-E8C1-4C57-B64D-652DD43A332D}" type="datetimeFigureOut">
               <a:rPr lang="it-IT" smtClean="0"/>
-              <a:t>19/10/2018</a:t>
+              <a:t>20/10/2018</a:t>
             </a:fld>
             <a:endParaRPr lang="it-IT"/>
           </a:p>
@@ -1772,7 +1772,7 @@
           <a:p>
             <a:fld id="{0914D3B2-4EE6-476D-8EC9-0B9A2CDA4F7D}" type="slidenum">
               <a:rPr lang="it-IT" smtClean="0"/>
-              <a:t>‹N›</a:t>
+              <a:t>‹#›</a:t>
             </a:fld>
             <a:endParaRPr lang="it-IT"/>
           </a:p>
@@ -1825,7 +1825,7 @@
           <a:p>
             <a:fld id="{AC1E7671-E8C1-4C57-B64D-652DD43A332D}" type="datetimeFigureOut">
               <a:rPr lang="it-IT" smtClean="0"/>
-              <a:t>19/10/2018</a:t>
+              <a:t>20/10/2018</a:t>
             </a:fld>
             <a:endParaRPr lang="it-IT"/>
           </a:p>
@@ -1867,7 +1867,7 @@
           <a:p>
             <a:fld id="{0914D3B2-4EE6-476D-8EC9-0B9A2CDA4F7D}" type="slidenum">
               <a:rPr lang="it-IT" smtClean="0"/>
-              <a:t>‹N›</a:t>
+              <a:t>‹#›</a:t>
             </a:fld>
             <a:endParaRPr lang="it-IT"/>
           </a:p>
@@ -2102,7 +2102,7 @@
           <a:p>
             <a:fld id="{AC1E7671-E8C1-4C57-B64D-652DD43A332D}" type="datetimeFigureOut">
               <a:rPr lang="it-IT" smtClean="0"/>
-              <a:t>19/10/2018</a:t>
+              <a:t>20/10/2018</a:t>
             </a:fld>
             <a:endParaRPr lang="it-IT"/>
           </a:p>
@@ -2144,7 +2144,7 @@
           <a:p>
             <a:fld id="{0914D3B2-4EE6-476D-8EC9-0B9A2CDA4F7D}" type="slidenum">
               <a:rPr lang="it-IT" smtClean="0"/>
-              <a:t>‹N›</a:t>
+              <a:t>‹#›</a:t>
             </a:fld>
             <a:endParaRPr lang="it-IT"/>
           </a:p>
@@ -2359,7 +2359,7 @@
           <a:p>
             <a:fld id="{AC1E7671-E8C1-4C57-B64D-652DD43A332D}" type="datetimeFigureOut">
               <a:rPr lang="it-IT" smtClean="0"/>
-              <a:t>19/10/2018</a:t>
+              <a:t>20/10/2018</a:t>
             </a:fld>
             <a:endParaRPr lang="it-IT"/>
           </a:p>
@@ -2401,7 +2401,7 @@
           <a:p>
             <a:fld id="{0914D3B2-4EE6-476D-8EC9-0B9A2CDA4F7D}" type="slidenum">
               <a:rPr lang="it-IT" smtClean="0"/>
-              <a:t>‹N›</a:t>
+              <a:t>‹#›</a:t>
             </a:fld>
             <a:endParaRPr lang="it-IT"/>
           </a:p>
@@ -2572,7 +2572,7 @@
           <a:p>
             <a:fld id="{AC1E7671-E8C1-4C57-B64D-652DD43A332D}" type="datetimeFigureOut">
               <a:rPr lang="it-IT" smtClean="0"/>
-              <a:t>19/10/2018</a:t>
+              <a:t>20/10/2018</a:t>
             </a:fld>
             <a:endParaRPr lang="it-IT"/>
           </a:p>
@@ -2650,7 +2650,7 @@
           <a:p>
             <a:fld id="{0914D3B2-4EE6-476D-8EC9-0B9A2CDA4F7D}" type="slidenum">
               <a:rPr lang="it-IT" smtClean="0"/>
-              <a:t>‹N›</a:t>
+              <a:t>‹#›</a:t>
             </a:fld>
             <a:endParaRPr lang="it-IT"/>
           </a:p>
@@ -3012,7 +3012,7 @@
         </p:blipFill>
         <p:spPr>
           <a:xfrm>
-            <a:off x="0" y="-1"/>
+            <a:off x="8238" y="-1"/>
             <a:ext cx="12116888" cy="6858001"/>
           </a:xfrm>
           <a:prstGeom prst="rect">
@@ -3486,7 +3486,15 @@
           <a:p>
             <a:r>
               <a:rPr lang="it-IT" dirty="0"/>
-              <a:t>Sotto la voce categorie sono mostrate diverse opzioni che portano a oggetti di una determinata categoria o a oggetti più gettonati (Chi ne ha più ne metta)</a:t>
+              <a:t>Sotto la voce categorie sono mostrate diverse opzioni che portano a oggetti di una determinata categoria o a oggetti più gettonati </a:t>
+            </a:r>
+            <a:r>
+              <a:rPr lang="it-IT"/>
+              <a:t>(Chi più </a:t>
+            </a:r>
+            <a:r>
+              <a:rPr lang="it-IT" dirty="0"/>
+              <a:t>ne ha più ne metta)</a:t>
             </a:r>
           </a:p>
           <a:p>

</xml_diff>

<commit_message>
Aggiunta una grafica al powerpoint, migliorato il testo per renderlo più discorsivo
</commit_message>
<xml_diff>
--- a/mockup/presentazione.pptx
+++ b/mockup/presentazione.pptx
@@ -2424,9 +2424,21 @@
 <p:sldMaster xmlns:a="http://schemas.openxmlformats.org/drawingml/2006/main" xmlns:r="http://schemas.openxmlformats.org/officeDocument/2006/relationships" xmlns:p="http://schemas.openxmlformats.org/presentationml/2006/main">
   <p:cSld>
     <p:bg>
-      <p:bgRef idx="1001">
-        <a:schemeClr val="bg1"/>
-      </p:bgRef>
+      <p:bgPr>
+        <a:gradFill flip="none" rotWithShape="1">
+          <a:gsLst>
+            <a:gs pos="84000">
+              <a:srgbClr val="C9D1DB"/>
+            </a:gs>
+            <a:gs pos="100000">
+              <a:srgbClr val="CDDC39"/>
+            </a:gs>
+          </a:gsLst>
+          <a:lin ang="4800000" scaled="0"/>
+          <a:tileRect/>
+        </a:gradFill>
+        <a:effectLst/>
+      </p:bgPr>
     </p:bg>
     <p:spTree>
       <p:nvGrpSpPr>
@@ -2985,47 +2997,75 @@
           <a:chExt cx="0" cy="0"/>
         </a:xfrm>
       </p:grpSpPr>
-      <p:pic>
-        <p:nvPicPr>
-          <p:cNvPr id="5" name="Immagine 4">
+      <p:sp>
+        <p:nvSpPr>
+          <p:cNvPr id="10" name="Rectangle 9">
             <a:extLst>
               <a:ext uri="{FF2B5EF4-FFF2-40B4-BE49-F238E27FC236}">
-                <a16:creationId xmlns:a16="http://schemas.microsoft.com/office/drawing/2014/main" id="{5FAE6328-D6C1-49D7-84EE-FB405140984B}"/>
+                <a16:creationId xmlns:a16="http://schemas.microsoft.com/office/drawing/2014/main" id="{57845966-6EFC-468A-9CC7-BAB4B95854E7}"/>
+              </a:ext>
+              <a:ext uri="{C183D7F6-B498-43B3-948B-1728B52AA6E4}">
+                <adec:decorative xmlns:adec="http://schemas.microsoft.com/office/drawing/2017/decorative" val="1"/>
               </a:ext>
             </a:extLst>
           </p:cNvPr>
-          <p:cNvPicPr>
-            <a:picLocks noChangeAspect="1"/>
-          </p:cNvPicPr>
-          <p:nvPr/>
-        </p:nvPicPr>
-        <p:blipFill rotWithShape="1">
-          <a:blip r:embed="rId2">
-            <a:extLst>
-              <a:ext uri="{28A0092B-C50C-407E-A947-70E740481C1C}">
-                <a14:useLocalDpi xmlns:a14="http://schemas.microsoft.com/office/drawing/2010/main" val="0"/>
-              </a:ext>
-            </a:extLst>
-          </a:blip>
-          <a:srcRect l="-149" t="9112" r="148" b="61915"/>
-          <a:stretch/>
-        </p:blipFill>
-        <p:spPr>
-          <a:xfrm>
-            <a:off x="8238" y="-1"/>
-            <a:ext cx="12116888" cy="6858001"/>
+          <p:cNvSpPr>
+            <a:spLocks noGrp="1" noRot="1" noChangeAspect="1" noMove="1" noResize="1" noEditPoints="1" noAdjustHandles="1" noChangeArrowheads="1" noChangeShapeType="1" noTextEdit="1"/>
+          </p:cNvSpPr>
+          <p:nvPr>
+            <p:extLst>
+              <p:ext uri="{386F3935-93C4-4BCD-93E2-E3B085C9AB24}">
+                <p16:designElem xmlns:p16="http://schemas.microsoft.com/office/powerpoint/2015/main" val="1"/>
+              </p:ext>
+            </p:extLst>
+          </p:nvPr>
+        </p:nvSpPr>
+        <p:spPr>
+          <a:xfrm>
+            <a:off x="1354372" y="0"/>
+            <a:ext cx="9483256" cy="6858000"/>
           </a:xfrm>
           <a:prstGeom prst="rect">
             <a:avLst/>
           </a:prstGeom>
-        </p:spPr>
-      </p:pic>
+          <a:solidFill>
+            <a:srgbClr val="547176"/>
+          </a:solidFill>
+          <a:ln>
+            <a:noFill/>
+          </a:ln>
+        </p:spPr>
+        <p:style>
+          <a:lnRef idx="2">
+            <a:schemeClr val="accent1">
+              <a:shade val="50000"/>
+            </a:schemeClr>
+          </a:lnRef>
+          <a:fillRef idx="1">
+            <a:schemeClr val="accent1"/>
+          </a:fillRef>
+          <a:effectRef idx="0">
+            <a:schemeClr val="accent1"/>
+          </a:effectRef>
+          <a:fontRef idx="minor">
+            <a:schemeClr val="lt1"/>
+          </a:fontRef>
+        </p:style>
+        <p:txBody>
+          <a:bodyPr rtlCol="0" anchor="ctr"/>
+          <a:lstStyle/>
+          <a:p>
+            <a:pPr algn="ctr"/>
+            <a:endParaRPr lang="en-US"/>
+          </a:p>
+        </p:txBody>
+      </p:sp>
       <p:pic>
         <p:nvPicPr>
-          <p:cNvPr id="10" name="Picture 9">
+          <p:cNvPr id="12" name="Picture 11">
             <a:extLst>
               <a:ext uri="{FF2B5EF4-FFF2-40B4-BE49-F238E27FC236}">
-                <a16:creationId xmlns:a16="http://schemas.microsoft.com/office/drawing/2014/main" id="{CB607B98-7700-4DC9-8BE8-A876255F9C52}"/>
+                <a16:creationId xmlns:a16="http://schemas.microsoft.com/office/drawing/2014/main" id="{75554383-98AF-4A47-BB65-705FAAA4BE6A}"/>
               </a:ext>
               <a:ext uri="{C183D7F6-B498-43B3-948B-1728B52AA6E4}">
                 <adec:decorative xmlns:adec="http://schemas.microsoft.com/office/drawing/2017/decorative" val="1"/>
@@ -3044,7 +3084,7 @@
           </p:nvPr>
         </p:nvPicPr>
         <p:blipFill>
-          <a:blip r:embed="rId3">
+          <a:blip r:embed="rId2">
             <a:extLst>
               <a:ext uri="{28A0092B-C50C-407E-A947-70E740481C1C}">
                 <a14:useLocalDpi xmlns:a14="http://schemas.microsoft.com/office/drawing/2010/main" val="0"/>
@@ -3059,6 +3099,280 @@
           <a:xfrm>
             <a:off x="0" y="0"/>
             <a:ext cx="12192000" cy="6858000"/>
+          </a:xfrm>
+          <a:prstGeom prst="rect">
+            <a:avLst/>
+          </a:prstGeom>
+        </p:spPr>
+      </p:pic>
+      <p:sp>
+        <p:nvSpPr>
+          <p:cNvPr id="14" name="Freeform: Shape 13">
+            <a:extLst>
+              <a:ext uri="{FF2B5EF4-FFF2-40B4-BE49-F238E27FC236}">
+                <a16:creationId xmlns:a16="http://schemas.microsoft.com/office/drawing/2014/main" id="{ADAD1991-FFD1-4E94-ABAB-7560D33008E4}"/>
+              </a:ext>
+              <a:ext uri="{C183D7F6-B498-43B3-948B-1728B52AA6E4}">
+                <adec:decorative xmlns:adec="http://schemas.microsoft.com/office/drawing/2017/decorative" val="1"/>
+              </a:ext>
+            </a:extLst>
+          </p:cNvPr>
+          <p:cNvSpPr>
+            <a:spLocks noGrp="1" noRot="1" noChangeAspect="1" noMove="1" noResize="1" noEditPoints="1" noAdjustHandles="1" noChangeArrowheads="1" noChangeShapeType="1" noTextEdit="1"/>
+          </p:cNvSpPr>
+          <p:nvPr>
+            <p:extLst>
+              <p:ext uri="{386F3935-93C4-4BCD-93E2-E3B085C9AB24}">
+                <p16:designElem xmlns:p16="http://schemas.microsoft.com/office/powerpoint/2015/main" val="1"/>
+              </p:ext>
+            </p:extLst>
+          </p:nvPr>
+        </p:nvSpPr>
+        <p:spPr>
+          <a:xfrm>
+            <a:off x="2144484" y="0"/>
+            <a:ext cx="7837716" cy="6858000"/>
+          </a:xfrm>
+          <a:custGeom>
+            <a:avLst/>
+            <a:gdLst>
+              <a:gd name="connsiteX0" fmla="*/ 2232159 w 7837716"/>
+              <a:gd name="connsiteY0" fmla="*/ 0 h 6858000"/>
+              <a:gd name="connsiteX1" fmla="*/ 5605557 w 7837716"/>
+              <a:gd name="connsiteY1" fmla="*/ 0 h 6858000"/>
+              <a:gd name="connsiteX2" fmla="*/ 5617845 w 7837716"/>
+              <a:gd name="connsiteY2" fmla="*/ 5384 h 6858000"/>
+              <a:gd name="connsiteX3" fmla="*/ 7837716 w 7837716"/>
+              <a:gd name="connsiteY3" fmla="*/ 3429000 h 6858000"/>
+              <a:gd name="connsiteX4" fmla="*/ 5617845 w 7837716"/>
+              <a:gd name="connsiteY4" fmla="*/ 6852616 h 6858000"/>
+              <a:gd name="connsiteX5" fmla="*/ 5605557 w 7837716"/>
+              <a:gd name="connsiteY5" fmla="*/ 6858000 h 6858000"/>
+              <a:gd name="connsiteX6" fmla="*/ 2232159 w 7837716"/>
+              <a:gd name="connsiteY6" fmla="*/ 6858000 h 6858000"/>
+              <a:gd name="connsiteX7" fmla="*/ 2219871 w 7837716"/>
+              <a:gd name="connsiteY7" fmla="*/ 6852616 h 6858000"/>
+              <a:gd name="connsiteX8" fmla="*/ 0 w 7837716"/>
+              <a:gd name="connsiteY8" fmla="*/ 3429000 h 6858000"/>
+              <a:gd name="connsiteX9" fmla="*/ 2219871 w 7837716"/>
+              <a:gd name="connsiteY9" fmla="*/ 5384 h 6858000"/>
+            </a:gdLst>
+            <a:ahLst/>
+            <a:cxnLst>
+              <a:cxn ang="0">
+                <a:pos x="connsiteX0" y="connsiteY0"/>
+              </a:cxn>
+              <a:cxn ang="0">
+                <a:pos x="connsiteX1" y="connsiteY1"/>
+              </a:cxn>
+              <a:cxn ang="0">
+                <a:pos x="connsiteX2" y="connsiteY2"/>
+              </a:cxn>
+              <a:cxn ang="0">
+                <a:pos x="connsiteX3" y="connsiteY3"/>
+              </a:cxn>
+              <a:cxn ang="0">
+                <a:pos x="connsiteX4" y="connsiteY4"/>
+              </a:cxn>
+              <a:cxn ang="0">
+                <a:pos x="connsiteX5" y="connsiteY5"/>
+              </a:cxn>
+              <a:cxn ang="0">
+                <a:pos x="connsiteX6" y="connsiteY6"/>
+              </a:cxn>
+              <a:cxn ang="0">
+                <a:pos x="connsiteX7" y="connsiteY7"/>
+              </a:cxn>
+              <a:cxn ang="0">
+                <a:pos x="connsiteX8" y="connsiteY8"/>
+              </a:cxn>
+              <a:cxn ang="0">
+                <a:pos x="connsiteX9" y="connsiteY9"/>
+              </a:cxn>
+            </a:cxnLst>
+            <a:rect l="l" t="t" r="r" b="b"/>
+            <a:pathLst>
+              <a:path w="7837716" h="6858000">
+                <a:moveTo>
+                  <a:pt x="2232159" y="0"/>
+                </a:moveTo>
+                <a:lnTo>
+                  <a:pt x="5605557" y="0"/>
+                </a:lnTo>
+                <a:lnTo>
+                  <a:pt x="5617845" y="5384"/>
+                </a:lnTo>
+                <a:cubicBezTo>
+                  <a:pt x="6931322" y="618789"/>
+                  <a:pt x="7837716" y="1921305"/>
+                  <a:pt x="7837716" y="3429000"/>
+                </a:cubicBezTo>
+                <a:cubicBezTo>
+                  <a:pt x="7837716" y="4936696"/>
+                  <a:pt x="6931322" y="6239212"/>
+                  <a:pt x="5617845" y="6852616"/>
+                </a:cubicBezTo>
+                <a:lnTo>
+                  <a:pt x="5605557" y="6858000"/>
+                </a:lnTo>
+                <a:lnTo>
+                  <a:pt x="2232159" y="6858000"/>
+                </a:lnTo>
+                <a:lnTo>
+                  <a:pt x="2219871" y="6852616"/>
+                </a:lnTo>
+                <a:cubicBezTo>
+                  <a:pt x="906394" y="6239212"/>
+                  <a:pt x="0" y="4936696"/>
+                  <a:pt x="0" y="3429000"/>
+                </a:cubicBezTo>
+                <a:cubicBezTo>
+                  <a:pt x="0" y="1921305"/>
+                  <a:pt x="906394" y="618789"/>
+                  <a:pt x="2219871" y="5384"/>
+                </a:cubicBezTo>
+                <a:close/>
+              </a:path>
+            </a:pathLst>
+          </a:custGeom>
+          <a:solidFill>
+            <a:schemeClr val="bg1"/>
+          </a:solidFill>
+          <a:ln>
+            <a:gradFill>
+              <a:gsLst>
+                <a:gs pos="0">
+                  <a:schemeClr val="accent1">
+                    <a:lumMod val="40000"/>
+                    <a:lumOff val="60000"/>
+                  </a:schemeClr>
+                </a:gs>
+                <a:gs pos="23000">
+                  <a:schemeClr val="accent1">
+                    <a:lumMod val="45000"/>
+                    <a:lumOff val="55000"/>
+                  </a:schemeClr>
+                </a:gs>
+                <a:gs pos="83000">
+                  <a:schemeClr val="bg2">
+                    <a:lumMod val="82000"/>
+                  </a:schemeClr>
+                </a:gs>
+                <a:gs pos="100000">
+                  <a:schemeClr val="bg2">
+                    <a:lumMod val="87000"/>
+                  </a:schemeClr>
+                </a:gs>
+              </a:gsLst>
+              <a:lin ang="5400000" scaled="1"/>
+            </a:gradFill>
+          </a:ln>
+        </p:spPr>
+        <p:style>
+          <a:lnRef idx="2">
+            <a:schemeClr val="accent1">
+              <a:shade val="50000"/>
+            </a:schemeClr>
+          </a:lnRef>
+          <a:fillRef idx="1">
+            <a:schemeClr val="accent1"/>
+          </a:fillRef>
+          <a:effectRef idx="0">
+            <a:schemeClr val="accent1"/>
+          </a:effectRef>
+          <a:fontRef idx="minor">
+            <a:schemeClr val="lt1"/>
+          </a:fontRef>
+        </p:style>
+        <p:txBody>
+          <a:bodyPr wrap="square" rtlCol="0" anchor="ctr">
+            <a:noAutofit/>
+          </a:bodyPr>
+          <a:lstStyle/>
+          <a:p>
+            <a:pPr algn="ctr"/>
+            <a:endParaRPr lang="en-US"/>
+          </a:p>
+        </p:txBody>
+      </p:sp>
+      <p:sp>
+        <p:nvSpPr>
+          <p:cNvPr id="6" name="Oval 5">
+            <a:extLst>
+              <a:ext uri="{FF2B5EF4-FFF2-40B4-BE49-F238E27FC236}">
+                <a16:creationId xmlns:a16="http://schemas.microsoft.com/office/drawing/2014/main" id="{1D8172A0-869B-41BD-9CAF-714E1791A1DC}"/>
+              </a:ext>
+            </a:extLst>
+          </p:cNvPr>
+          <p:cNvSpPr/>
+          <p:nvPr/>
+        </p:nvSpPr>
+        <p:spPr>
+          <a:xfrm>
+            <a:off x="2144484" y="-380999"/>
+            <a:ext cx="7837716" cy="7610474"/>
+          </a:xfrm>
+          <a:prstGeom prst="ellipse">
+            <a:avLst/>
+          </a:prstGeom>
+          <a:solidFill>
+            <a:srgbClr val="607D8B"/>
+          </a:solidFill>
+        </p:spPr>
+        <p:style>
+          <a:lnRef idx="2">
+            <a:schemeClr val="accent1">
+              <a:shade val="50000"/>
+            </a:schemeClr>
+          </a:lnRef>
+          <a:fillRef idx="1">
+            <a:schemeClr val="accent1"/>
+          </a:fillRef>
+          <a:effectRef idx="0">
+            <a:schemeClr val="accent1"/>
+          </a:effectRef>
+          <a:fontRef idx="minor">
+            <a:schemeClr val="lt1"/>
+          </a:fontRef>
+        </p:style>
+        <p:txBody>
+          <a:bodyPr rtlCol="0" anchor="ctr"/>
+          <a:lstStyle/>
+          <a:p>
+            <a:pPr algn="ctr"/>
+            <a:endParaRPr lang="en-US"/>
+          </a:p>
+        </p:txBody>
+      </p:sp>
+      <p:pic>
+        <p:nvPicPr>
+          <p:cNvPr id="9" name="Immagine 4">
+            <a:extLst>
+              <a:ext uri="{FF2B5EF4-FFF2-40B4-BE49-F238E27FC236}">
+                <a16:creationId xmlns:a16="http://schemas.microsoft.com/office/drawing/2014/main" id="{E4F32979-86A9-4296-B4A8-6081E959A2AE}"/>
+              </a:ext>
+            </a:extLst>
+          </p:cNvPr>
+          <p:cNvPicPr>
+            <a:picLocks noChangeAspect="1"/>
+          </p:cNvPicPr>
+          <p:nvPr/>
+        </p:nvPicPr>
+        <p:blipFill rotWithShape="1">
+          <a:blip r:embed="rId3">
+            <a:extLst>
+              <a:ext uri="{28A0092B-C50C-407E-A947-70E740481C1C}">
+                <a14:useLocalDpi xmlns:a14="http://schemas.microsoft.com/office/drawing/2010/main" val="0"/>
+              </a:ext>
+            </a:extLst>
+          </a:blip>
+          <a:srcRect t="5655" b="59529"/>
+          <a:stretch/>
+        </p:blipFill>
+        <p:spPr>
+          <a:xfrm>
+            <a:off x="2600341" y="1352551"/>
+            <a:ext cx="6755533" cy="4181474"/>
           </a:xfrm>
           <a:prstGeom prst="rect">
             <a:avLst/>
@@ -3075,6 +3389,18 @@
   <p:clrMapOvr>
     <a:masterClrMapping/>
   </p:clrMapOvr>
+  <mc:AlternateContent xmlns:mc="http://schemas.openxmlformats.org/markup-compatibility/2006">
+    <mc:Choice xmlns:p14="http://schemas.microsoft.com/office/powerpoint/2010/main" Requires="p14">
+      <p:transition spd="slow" p14:dur="3400">
+        <p14:reveal/>
+      </p:transition>
+    </mc:Choice>
+    <mc:Fallback>
+      <p:transition spd="slow">
+        <p:fade/>
+      </p:transition>
+    </mc:Fallback>
+  </mc:AlternateContent>
 </p:sld>
 </file>
 
@@ -3095,12 +3421,71 @@
           <a:chExt cx="0" cy="0"/>
         </a:xfrm>
       </p:grpSpPr>
+      <p:sp>
+        <p:nvSpPr>
+          <p:cNvPr id="8" name="CasellaDiTesto 7">
+            <a:extLst>
+              <a:ext uri="{FF2B5EF4-FFF2-40B4-BE49-F238E27FC236}">
+                <a16:creationId xmlns:a16="http://schemas.microsoft.com/office/drawing/2014/main" id="{5E5F38AB-2989-4DE6-94EB-00809EFF1BE5}"/>
+              </a:ext>
+            </a:extLst>
+          </p:cNvPr>
+          <p:cNvSpPr txBox="1"/>
+          <p:nvPr/>
+        </p:nvSpPr>
+        <p:spPr>
+          <a:xfrm>
+            <a:off x="4632798" y="2314230"/>
+            <a:ext cx="7292502" cy="2585323"/>
+          </a:xfrm>
+          <a:prstGeom prst="rect">
+            <a:avLst/>
+          </a:prstGeom>
+          <a:noFill/>
+        </p:spPr>
+        <p:txBody>
+          <a:bodyPr wrap="square" rtlCol="0">
+            <a:spAutoFit/>
+          </a:bodyPr>
+          <a:lstStyle/>
+          <a:p>
+            <a:pPr marL="342900" indent="-342900">
+              <a:buFont typeface="Arial" panose="020B0604020202020204" pitchFamily="34" charset="0"/>
+              <a:buChar char="•"/>
+            </a:pPr>
+            <a:r>
+              <a:rPr lang="it-IT" sz="2400" dirty="0"/>
+              <a:t>Applicazione pensata per dare e prendere in affitto beni </a:t>
+            </a:r>
+          </a:p>
+          <a:p>
+            <a:endParaRPr lang="it-IT" sz="2400" dirty="0"/>
+          </a:p>
+          <a:p>
+            <a:pPr marL="342900" indent="-342900">
+              <a:buFont typeface="Arial" panose="020B0604020202020204" pitchFamily="34" charset="0"/>
+              <a:buChar char="•"/>
+            </a:pPr>
+            <a:r>
+              <a:rPr lang="it-IT" sz="2400" dirty="0"/>
+              <a:t>Intenzione di rivolgersi a privati e professionisti che abbiano bisogno di utilizzare un determinato bene per un breve arco di tempo, evitandone così l’acquisto</a:t>
+            </a:r>
+          </a:p>
+          <a:p>
+            <a:pPr marL="342900" indent="-342900">
+              <a:buFont typeface="Arial" panose="020B0604020202020204" pitchFamily="34" charset="0"/>
+              <a:buChar char="•"/>
+            </a:pPr>
+            <a:endParaRPr lang="it-IT" dirty="0"/>
+          </a:p>
+        </p:txBody>
+      </p:sp>
       <p:pic>
         <p:nvPicPr>
-          <p:cNvPr id="5" name="Immagine 4">
+          <p:cNvPr id="3" name="Picture 2">
             <a:extLst>
               <a:ext uri="{FF2B5EF4-FFF2-40B4-BE49-F238E27FC236}">
-                <a16:creationId xmlns:a16="http://schemas.microsoft.com/office/drawing/2014/main" id="{2D9E4A3E-42A8-4D02-A45A-42BD3077C2AD}"/>
+                <a16:creationId xmlns:a16="http://schemas.microsoft.com/office/drawing/2014/main" id="{C5BE1A6D-7001-42F9-9D19-CE8217D41157}"/>
               </a:ext>
             </a:extLst>
           </p:cNvPr>
@@ -3123,105 +3508,50 @@
         </p:blipFill>
         <p:spPr>
           <a:xfrm>
-            <a:off x="362104" y="309716"/>
-            <a:ext cx="3509195" cy="6238568"/>
+            <a:off x="0" y="0"/>
+            <a:ext cx="4632798" cy="6858000"/>
           </a:xfrm>
           <a:prstGeom prst="rect">
             <a:avLst/>
           </a:prstGeom>
         </p:spPr>
       </p:pic>
-      <p:sp>
-        <p:nvSpPr>
-          <p:cNvPr id="8" name="CasellaDiTesto 7">
+      <p:pic>
+        <p:nvPicPr>
+          <p:cNvPr id="5" name="Immagine 4">
             <a:extLst>
               <a:ext uri="{FF2B5EF4-FFF2-40B4-BE49-F238E27FC236}">
-                <a16:creationId xmlns:a16="http://schemas.microsoft.com/office/drawing/2014/main" id="{5E5F38AB-2989-4DE6-94EB-00809EFF1BE5}"/>
+                <a16:creationId xmlns:a16="http://schemas.microsoft.com/office/drawing/2014/main" id="{2D9E4A3E-42A8-4D02-A45A-42BD3077C2AD}"/>
               </a:ext>
             </a:extLst>
           </p:cNvPr>
-          <p:cNvSpPr txBox="1"/>
+          <p:cNvPicPr>
+            <a:picLocks noChangeAspect="1"/>
+          </p:cNvPicPr>
           <p:nvPr/>
-        </p:nvSpPr>
-        <p:spPr>
-          <a:xfrm>
-            <a:off x="4225413" y="715297"/>
-            <a:ext cx="7455310" cy="3785652"/>
+        </p:nvPicPr>
+        <p:blipFill>
+          <a:blip r:embed="rId3">
+            <a:extLst>
+              <a:ext uri="{28A0092B-C50C-407E-A947-70E740481C1C}">
+                <a14:useLocalDpi xmlns:a14="http://schemas.microsoft.com/office/drawing/2010/main" val="0"/>
+              </a:ext>
+            </a:extLst>
+          </a:blip>
+          <a:stretch>
+            <a:fillRect/>
+          </a:stretch>
+        </p:blipFill>
+        <p:spPr>
+          <a:xfrm>
+            <a:off x="1254981" y="1512348"/>
+            <a:ext cx="2200550" cy="3912088"/>
           </a:xfrm>
           <a:prstGeom prst="rect">
             <a:avLst/>
           </a:prstGeom>
-          <a:noFill/>
-        </p:spPr>
-        <p:txBody>
-          <a:bodyPr wrap="square" rtlCol="0">
-            <a:spAutoFit/>
-          </a:bodyPr>
-          <a:lstStyle/>
-          <a:p>
-            <a:pPr marL="342900" indent="-342900">
-              <a:buFont typeface="Arial" panose="020B0604020202020204" pitchFamily="34" charset="0"/>
-              <a:buChar char="•"/>
-            </a:pPr>
-            <a:r>
-              <a:rPr lang="it-IT" sz="2400" dirty="0"/>
-              <a:t>Applicazione pensata per dare e prendere in affitto beni </a:t>
-            </a:r>
-          </a:p>
-          <a:p>
-            <a:pPr marL="342900" indent="-342900">
-              <a:buFont typeface="Arial" panose="020B0604020202020204" pitchFamily="34" charset="0"/>
-              <a:buChar char="•"/>
-            </a:pPr>
-            <a:endParaRPr lang="it-IT" sz="2400" dirty="0"/>
-          </a:p>
-          <a:p>
-            <a:pPr marL="342900" indent="-342900">
-              <a:buFont typeface="Arial" panose="020B0604020202020204" pitchFamily="34" charset="0"/>
-              <a:buChar char="•"/>
-            </a:pPr>
-            <a:endParaRPr lang="it-IT" sz="2400" dirty="0"/>
-          </a:p>
-          <a:p>
-            <a:pPr marL="342900" indent="-342900">
-              <a:buFont typeface="Arial" panose="020B0604020202020204" pitchFamily="34" charset="0"/>
-              <a:buChar char="•"/>
-            </a:pPr>
-            <a:endParaRPr lang="it-IT" sz="2400" dirty="0"/>
-          </a:p>
-          <a:p>
-            <a:pPr marL="342900" indent="-342900">
-              <a:buFont typeface="Arial" panose="020B0604020202020204" pitchFamily="34" charset="0"/>
-              <a:buChar char="•"/>
-            </a:pPr>
-            <a:endParaRPr lang="it-IT" sz="2400" dirty="0"/>
-          </a:p>
-          <a:p>
-            <a:pPr marL="342900" indent="-342900">
-              <a:buFont typeface="Arial" panose="020B0604020202020204" pitchFamily="34" charset="0"/>
-              <a:buChar char="•"/>
-            </a:pPr>
-            <a:endParaRPr lang="it-IT" sz="2400" dirty="0"/>
-          </a:p>
-          <a:p>
-            <a:pPr marL="342900" indent="-342900">
-              <a:buFont typeface="Arial" panose="020B0604020202020204" pitchFamily="34" charset="0"/>
-              <a:buChar char="•"/>
-            </a:pPr>
-            <a:r>
-              <a:rPr lang="it-IT" sz="2400" dirty="0"/>
-              <a:t>Intenzione di rivolgersi a privati e professionisti che abbiano bisogno di utilizzare un determinato bene per un breve arco di tempo, evitandone così l’acquisto</a:t>
-            </a:r>
-          </a:p>
-          <a:p>
-            <a:pPr marL="342900" indent="-342900">
-              <a:buFont typeface="Arial" panose="020B0604020202020204" pitchFamily="34" charset="0"/>
-              <a:buChar char="•"/>
-            </a:pPr>
-            <a:endParaRPr lang="it-IT" sz="2400" dirty="0"/>
-          </a:p>
-        </p:txBody>
-      </p:sp>
+        </p:spPr>
+      </p:pic>
     </p:spTree>
     <p:extLst>
       <p:ext uri="{BB962C8B-B14F-4D97-AF65-F5344CB8AC3E}">
@@ -3232,6 +3562,18 @@
   <p:clrMapOvr>
     <a:masterClrMapping/>
   </p:clrMapOvr>
+  <mc:AlternateContent xmlns:mc="http://schemas.openxmlformats.org/markup-compatibility/2006">
+    <mc:Choice xmlns:p14="http://schemas.microsoft.com/office/powerpoint/2010/main" Requires="p14">
+      <p:transition spd="slow" p14:dur="1750">
+        <p14:reveal/>
+      </p:transition>
+    </mc:Choice>
+    <mc:Fallback>
+      <p:transition spd="slow">
+        <p:fade/>
+      </p:transition>
+    </mc:Fallback>
+  </mc:AlternateContent>
 </p:sld>
 </file>
 
@@ -3285,6 +3627,17 @@
               <a:buChar char="•"/>
             </a:pPr>
             <a:r>
+              <a:rPr lang="it-IT" sz="2400" b="1" kern="1200" dirty="0">
+                <a:solidFill>
+                  <a:schemeClr val="tx1"/>
+                </a:solidFill>
+                <a:latin typeface="+mn-lt"/>
+                <a:ea typeface="+mn-ea"/>
+                <a:cs typeface="+mn-cs"/>
+              </a:rPr>
+              <a:t>La schermata principale </a:t>
+            </a:r>
+            <a:r>
               <a:rPr lang="it-IT" sz="2400" kern="1200" dirty="0">
                 <a:solidFill>
                   <a:schemeClr val="tx1"/>
@@ -3293,7 +3646,7 @@
                 <a:ea typeface="+mn-ea"/>
                 <a:cs typeface="+mn-cs"/>
               </a:rPr>
-              <a:t>L’applicazione funziona con un feed di annunci contenenti le specifiche, il prezzo giornaliero del prodotto e la persona o società che affitta il bene</a:t>
+              <a:t>dell’applicazione presenterà vari annunci, ordinabili secondo varie logiche </a:t>
             </a:r>
           </a:p>
           <a:p>
@@ -3310,7 +3663,15 @@
             </a:pPr>
             <a:r>
               <a:rPr lang="it-IT" sz="2400" dirty="0"/>
-              <a:t>Nella barra in alto è possibile eseguire ricerche di oggetti specifici</a:t>
+              <a:t>Esisterà uno </a:t>
+            </a:r>
+            <a:r>
+              <a:rPr lang="it-IT" sz="2400" b="1" dirty="0"/>
+              <a:t>strumento di ricerca </a:t>
+            </a:r>
+            <a:r>
+              <a:rPr lang="it-IT" sz="2400" dirty="0"/>
+              <a:t>per trovare oggetti specifici</a:t>
             </a:r>
           </a:p>
           <a:p>
@@ -3327,7 +3688,23 @@
             </a:pPr>
             <a:r>
               <a:rPr lang="it-IT" sz="2400" dirty="0"/>
-              <a:t>Il pallino in alto a destra di colore rosso segnala eventuali notifiche</a:t>
+              <a:t>L’applicazione </a:t>
+            </a:r>
+            <a:r>
+              <a:rPr lang="it-IT" sz="2400" b="1" dirty="0"/>
+              <a:t>notificherà</a:t>
+            </a:r>
+            <a:r>
+              <a:rPr lang="it-IT" sz="2400" dirty="0"/>
+              <a:t> </a:t>
+            </a:r>
+            <a:r>
+              <a:rPr lang="it-IT" sz="2400" b="1" dirty="0"/>
+              <a:t>inoltre l’utente </a:t>
+            </a:r>
+            <a:r>
+              <a:rPr lang="it-IT" sz="2400" dirty="0"/>
+              <a:t>riguardo ad eventi legati alla sua attività (messaggi ricevuti, feedback…)</a:t>
             </a:r>
           </a:p>
           <a:p>
@@ -3344,7 +3721,15 @@
             </a:pPr>
             <a:r>
               <a:rPr lang="it-IT" sz="2400" dirty="0"/>
-              <a:t>È possibile aprire un menù a tendina nella parte sinistra dello schermo </a:t>
+              <a:t>Esisteranno </a:t>
+            </a:r>
+            <a:r>
+              <a:rPr lang="it-IT" sz="2400" b="1" dirty="0"/>
+              <a:t>menù contestuali </a:t>
+            </a:r>
+            <a:r>
+              <a:rPr lang="it-IT" sz="2400" dirty="0"/>
+              <a:t>che daranno funzionalità aggiuntive</a:t>
             </a:r>
           </a:p>
           <a:p>
@@ -3365,10 +3750,10 @@
       </p:sp>
       <p:pic>
         <p:nvPicPr>
-          <p:cNvPr id="3" name="Immagine 2">
+          <p:cNvPr id="4" name="Picture 3">
             <a:extLst>
               <a:ext uri="{FF2B5EF4-FFF2-40B4-BE49-F238E27FC236}">
-                <a16:creationId xmlns:a16="http://schemas.microsoft.com/office/drawing/2014/main" id="{B17ED424-E68E-4E57-A236-DFC3C0F0D140}"/>
+                <a16:creationId xmlns:a16="http://schemas.microsoft.com/office/drawing/2014/main" id="{FC243B18-60A7-4D86-8C41-A0FD874519A6}"/>
               </a:ext>
             </a:extLst>
           </p:cNvPr>
@@ -3391,14 +3776,859 @@
         </p:blipFill>
         <p:spPr>
           <a:xfrm>
-            <a:off x="212694" y="201283"/>
-            <a:ext cx="3631182" cy="6455434"/>
+            <a:off x="0" y="0"/>
+            <a:ext cx="4632798" cy="6858000"/>
           </a:xfrm>
           <a:prstGeom prst="rect">
             <a:avLst/>
           </a:prstGeom>
         </p:spPr>
       </p:pic>
+      <p:pic>
+        <p:nvPicPr>
+          <p:cNvPr id="3" name="Immagine 2">
+            <a:extLst>
+              <a:ext uri="{FF2B5EF4-FFF2-40B4-BE49-F238E27FC236}">
+                <a16:creationId xmlns:a16="http://schemas.microsoft.com/office/drawing/2014/main" id="{B17ED424-E68E-4E57-A236-DFC3C0F0D140}"/>
+              </a:ext>
+            </a:extLst>
+          </p:cNvPr>
+          <p:cNvPicPr>
+            <a:picLocks noChangeAspect="1"/>
+          </p:cNvPicPr>
+          <p:nvPr/>
+        </p:nvPicPr>
+        <p:blipFill>
+          <a:blip r:embed="rId3">
+            <a:extLst>
+              <a:ext uri="{28A0092B-C50C-407E-A947-70E740481C1C}">
+                <a14:useLocalDpi xmlns:a14="http://schemas.microsoft.com/office/drawing/2010/main" val="0"/>
+              </a:ext>
+            </a:extLst>
+          </a:blip>
+          <a:stretch>
+            <a:fillRect/>
+          </a:stretch>
+        </p:blipFill>
+        <p:spPr>
+          <a:xfrm>
+            <a:off x="1251424" y="1491864"/>
+            <a:ext cx="2210762" cy="3930242"/>
+          </a:xfrm>
+          <a:prstGeom prst="rect">
+            <a:avLst/>
+          </a:prstGeom>
+        </p:spPr>
+      </p:pic>
+      <p:sp>
+        <p:nvSpPr>
+          <p:cNvPr id="2" name="Rectangle 1">
+            <a:extLst>
+              <a:ext uri="{FF2B5EF4-FFF2-40B4-BE49-F238E27FC236}">
+                <a16:creationId xmlns:a16="http://schemas.microsoft.com/office/drawing/2014/main" id="{54C8D654-87B8-4CB9-9847-B183C7315EB5}"/>
+              </a:ext>
+            </a:extLst>
+          </p:cNvPr>
+          <p:cNvSpPr/>
+          <p:nvPr/>
+        </p:nvSpPr>
+        <p:spPr>
+          <a:xfrm>
+            <a:off x="1177047" y="1978026"/>
+            <a:ext cx="2354093" cy="3151188"/>
+          </a:xfrm>
+          <a:prstGeom prst="rect">
+            <a:avLst/>
+          </a:prstGeom>
+          <a:noFill/>
+          <a:ln w="28575">
+            <a:solidFill>
+              <a:srgbClr val="FFC000"/>
+            </a:solidFill>
+          </a:ln>
+        </p:spPr>
+        <p:style>
+          <a:lnRef idx="2">
+            <a:schemeClr val="accent6">
+              <a:shade val="50000"/>
+            </a:schemeClr>
+          </a:lnRef>
+          <a:fillRef idx="1">
+            <a:schemeClr val="accent6"/>
+          </a:fillRef>
+          <a:effectRef idx="0">
+            <a:schemeClr val="accent6"/>
+          </a:effectRef>
+          <a:fontRef idx="minor">
+            <a:schemeClr val="lt1"/>
+          </a:fontRef>
+        </p:style>
+        <p:txBody>
+          <a:bodyPr rtlCol="0" anchor="ctr"/>
+          <a:lstStyle/>
+          <a:p>
+            <a:pPr algn="ctr"/>
+            <a:endParaRPr lang="en-US"/>
+          </a:p>
+        </p:txBody>
+      </p:sp>
+      <p:cxnSp>
+        <p:nvCxnSpPr>
+          <p:cNvPr id="8" name="Straight Connector 7">
+            <a:extLst>
+              <a:ext uri="{FF2B5EF4-FFF2-40B4-BE49-F238E27FC236}">
+                <a16:creationId xmlns:a16="http://schemas.microsoft.com/office/drawing/2014/main" id="{3FAC92AC-C913-4A3A-BAE6-59C55A5E8E0E}"/>
+              </a:ext>
+            </a:extLst>
+          </p:cNvPr>
+          <p:cNvCxnSpPr/>
+          <p:nvPr/>
+        </p:nvCxnSpPr>
+        <p:spPr>
+          <a:xfrm>
+            <a:off x="3531140" y="2179299"/>
+            <a:ext cx="1101658" cy="0"/>
+          </a:xfrm>
+          <a:prstGeom prst="line">
+            <a:avLst/>
+          </a:prstGeom>
+          <a:ln w="28575">
+            <a:solidFill>
+              <a:srgbClr val="FFC000"/>
+            </a:solidFill>
+          </a:ln>
+        </p:spPr>
+        <p:style>
+          <a:lnRef idx="1">
+            <a:schemeClr val="accent1"/>
+          </a:lnRef>
+          <a:fillRef idx="0">
+            <a:schemeClr val="accent1"/>
+          </a:fillRef>
+          <a:effectRef idx="0">
+            <a:schemeClr val="accent1"/>
+          </a:effectRef>
+          <a:fontRef idx="minor">
+            <a:schemeClr val="tx1"/>
+          </a:fontRef>
+        </p:style>
+      </p:cxnSp>
+      <p:cxnSp>
+        <p:nvCxnSpPr>
+          <p:cNvPr id="10" name="Straight Connector 9">
+            <a:extLst>
+              <a:ext uri="{FF2B5EF4-FFF2-40B4-BE49-F238E27FC236}">
+                <a16:creationId xmlns:a16="http://schemas.microsoft.com/office/drawing/2014/main" id="{63CC88DB-B670-4B16-A457-F9EDEC58F51B}"/>
+              </a:ext>
+            </a:extLst>
+          </p:cNvPr>
+          <p:cNvCxnSpPr>
+            <a:cxnSpLocks/>
+          </p:cNvCxnSpPr>
+          <p:nvPr/>
+        </p:nvCxnSpPr>
+        <p:spPr>
+          <a:xfrm flipV="1">
+            <a:off x="4632798" y="584201"/>
+            <a:ext cx="0" cy="1595098"/>
+          </a:xfrm>
+          <a:prstGeom prst="line">
+            <a:avLst/>
+          </a:prstGeom>
+          <a:ln w="28575">
+            <a:solidFill>
+              <a:srgbClr val="FFC000"/>
+            </a:solidFill>
+          </a:ln>
+        </p:spPr>
+        <p:style>
+          <a:lnRef idx="1">
+            <a:schemeClr val="accent1"/>
+          </a:lnRef>
+          <a:fillRef idx="0">
+            <a:schemeClr val="accent1"/>
+          </a:fillRef>
+          <a:effectRef idx="0">
+            <a:schemeClr val="accent1"/>
+          </a:effectRef>
+          <a:fontRef idx="minor">
+            <a:schemeClr val="tx1"/>
+          </a:fontRef>
+        </p:style>
+      </p:cxnSp>
+      <p:cxnSp>
+        <p:nvCxnSpPr>
+          <p:cNvPr id="12" name="Straight Connector 11">
+            <a:extLst>
+              <a:ext uri="{FF2B5EF4-FFF2-40B4-BE49-F238E27FC236}">
+                <a16:creationId xmlns:a16="http://schemas.microsoft.com/office/drawing/2014/main" id="{806458E4-56B5-4110-B997-0C75A33233F4}"/>
+              </a:ext>
+            </a:extLst>
+          </p:cNvPr>
+          <p:cNvCxnSpPr>
+            <a:cxnSpLocks/>
+          </p:cNvCxnSpPr>
+          <p:nvPr/>
+        </p:nvCxnSpPr>
+        <p:spPr>
+          <a:xfrm flipV="1">
+            <a:off x="4632798" y="590889"/>
+            <a:ext cx="450377" cy="1"/>
+          </a:xfrm>
+          <a:prstGeom prst="line">
+            <a:avLst/>
+          </a:prstGeom>
+          <a:ln w="28575">
+            <a:solidFill>
+              <a:srgbClr val="FFC000"/>
+            </a:solidFill>
+          </a:ln>
+        </p:spPr>
+        <p:style>
+          <a:lnRef idx="1">
+            <a:schemeClr val="accent1"/>
+          </a:lnRef>
+          <a:fillRef idx="0">
+            <a:schemeClr val="accent1"/>
+          </a:fillRef>
+          <a:effectRef idx="0">
+            <a:schemeClr val="accent1"/>
+          </a:effectRef>
+          <a:fontRef idx="minor">
+            <a:schemeClr val="tx1"/>
+          </a:fontRef>
+        </p:style>
+      </p:cxnSp>
+      <p:sp>
+        <p:nvSpPr>
+          <p:cNvPr id="15" name="Rectangle 14">
+            <a:extLst>
+              <a:ext uri="{FF2B5EF4-FFF2-40B4-BE49-F238E27FC236}">
+                <a16:creationId xmlns:a16="http://schemas.microsoft.com/office/drawing/2014/main" id="{324E5CC6-A696-4ED8-BEDE-96EFA8EBF446}"/>
+              </a:ext>
+            </a:extLst>
+          </p:cNvPr>
+          <p:cNvSpPr/>
+          <p:nvPr/>
+        </p:nvSpPr>
+        <p:spPr>
+          <a:xfrm>
+            <a:off x="1531620" y="1691640"/>
+            <a:ext cx="1402080" cy="251460"/>
+          </a:xfrm>
+          <a:prstGeom prst="rect">
+            <a:avLst/>
+          </a:prstGeom>
+          <a:noFill/>
+          <a:ln w="28575">
+            <a:solidFill>
+              <a:srgbClr val="0070C0"/>
+            </a:solidFill>
+          </a:ln>
+        </p:spPr>
+        <p:style>
+          <a:lnRef idx="2">
+            <a:schemeClr val="accent1">
+              <a:shade val="50000"/>
+            </a:schemeClr>
+          </a:lnRef>
+          <a:fillRef idx="1">
+            <a:schemeClr val="accent1"/>
+          </a:fillRef>
+          <a:effectRef idx="0">
+            <a:schemeClr val="accent1"/>
+          </a:effectRef>
+          <a:fontRef idx="minor">
+            <a:schemeClr val="lt1"/>
+          </a:fontRef>
+        </p:style>
+        <p:txBody>
+          <a:bodyPr rtlCol="0" anchor="ctr"/>
+          <a:lstStyle/>
+          <a:p>
+            <a:pPr algn="ctr"/>
+            <a:endParaRPr lang="en-US"/>
+          </a:p>
+        </p:txBody>
+      </p:sp>
+      <p:cxnSp>
+        <p:nvCxnSpPr>
+          <p:cNvPr id="17" name="Straight Connector 16">
+            <a:extLst>
+              <a:ext uri="{FF2B5EF4-FFF2-40B4-BE49-F238E27FC236}">
+                <a16:creationId xmlns:a16="http://schemas.microsoft.com/office/drawing/2014/main" id="{1B0FAD42-D778-423A-A05D-93DB7DFB08F0}"/>
+              </a:ext>
+            </a:extLst>
+          </p:cNvPr>
+          <p:cNvCxnSpPr>
+            <a:cxnSpLocks/>
+          </p:cNvCxnSpPr>
+          <p:nvPr/>
+        </p:nvCxnSpPr>
+        <p:spPr>
+          <a:xfrm flipV="1">
+            <a:off x="2616994" y="1398748"/>
+            <a:ext cx="0" cy="292892"/>
+          </a:xfrm>
+          <a:prstGeom prst="line">
+            <a:avLst/>
+          </a:prstGeom>
+          <a:ln w="28575">
+            <a:solidFill>
+              <a:srgbClr val="0070C0"/>
+            </a:solidFill>
+          </a:ln>
+        </p:spPr>
+        <p:style>
+          <a:lnRef idx="1">
+            <a:schemeClr val="accent1"/>
+          </a:lnRef>
+          <a:fillRef idx="0">
+            <a:schemeClr val="accent1"/>
+          </a:fillRef>
+          <a:effectRef idx="0">
+            <a:schemeClr val="accent1"/>
+          </a:effectRef>
+          <a:fontRef idx="minor">
+            <a:schemeClr val="tx1"/>
+          </a:fontRef>
+        </p:style>
+      </p:cxnSp>
+      <p:cxnSp>
+        <p:nvCxnSpPr>
+          <p:cNvPr id="19" name="Straight Connector 18">
+            <a:extLst>
+              <a:ext uri="{FF2B5EF4-FFF2-40B4-BE49-F238E27FC236}">
+                <a16:creationId xmlns:a16="http://schemas.microsoft.com/office/drawing/2014/main" id="{64F21B8D-FA9A-418D-A740-CA000C5307E7}"/>
+              </a:ext>
+            </a:extLst>
+          </p:cNvPr>
+          <p:cNvCxnSpPr>
+            <a:cxnSpLocks/>
+          </p:cNvCxnSpPr>
+          <p:nvPr/>
+        </p:nvCxnSpPr>
+        <p:spPr>
+          <a:xfrm>
+            <a:off x="4464844" y="1398748"/>
+            <a:ext cx="0" cy="652301"/>
+          </a:xfrm>
+          <a:prstGeom prst="line">
+            <a:avLst/>
+          </a:prstGeom>
+          <a:ln w="28575">
+            <a:solidFill>
+              <a:srgbClr val="0070C0"/>
+            </a:solidFill>
+          </a:ln>
+        </p:spPr>
+        <p:style>
+          <a:lnRef idx="1">
+            <a:schemeClr val="accent1"/>
+          </a:lnRef>
+          <a:fillRef idx="0">
+            <a:schemeClr val="accent1"/>
+          </a:fillRef>
+          <a:effectRef idx="0">
+            <a:schemeClr val="accent1"/>
+          </a:effectRef>
+          <a:fontRef idx="minor">
+            <a:schemeClr val="tx1"/>
+          </a:fontRef>
+        </p:style>
+      </p:cxnSp>
+      <p:cxnSp>
+        <p:nvCxnSpPr>
+          <p:cNvPr id="23" name="Straight Connector 22">
+            <a:extLst>
+              <a:ext uri="{FF2B5EF4-FFF2-40B4-BE49-F238E27FC236}">
+                <a16:creationId xmlns:a16="http://schemas.microsoft.com/office/drawing/2014/main" id="{201B301C-CB55-4AF1-82A9-6A9C2DD625F6}"/>
+              </a:ext>
+            </a:extLst>
+          </p:cNvPr>
+          <p:cNvCxnSpPr>
+            <a:cxnSpLocks/>
+          </p:cNvCxnSpPr>
+          <p:nvPr/>
+        </p:nvCxnSpPr>
+        <p:spPr>
+          <a:xfrm flipH="1">
+            <a:off x="4464844" y="2051049"/>
+            <a:ext cx="618334" cy="0"/>
+          </a:xfrm>
+          <a:prstGeom prst="line">
+            <a:avLst/>
+          </a:prstGeom>
+          <a:ln w="28575">
+            <a:solidFill>
+              <a:srgbClr val="0070C0"/>
+            </a:solidFill>
+          </a:ln>
+        </p:spPr>
+        <p:style>
+          <a:lnRef idx="1">
+            <a:schemeClr val="accent1"/>
+          </a:lnRef>
+          <a:fillRef idx="0">
+            <a:schemeClr val="accent1"/>
+          </a:fillRef>
+          <a:effectRef idx="0">
+            <a:schemeClr val="accent1"/>
+          </a:effectRef>
+          <a:fontRef idx="minor">
+            <a:schemeClr val="tx1"/>
+          </a:fontRef>
+        </p:style>
+      </p:cxnSp>
+      <p:cxnSp>
+        <p:nvCxnSpPr>
+          <p:cNvPr id="38" name="Straight Connector 37">
+            <a:extLst>
+              <a:ext uri="{FF2B5EF4-FFF2-40B4-BE49-F238E27FC236}">
+                <a16:creationId xmlns:a16="http://schemas.microsoft.com/office/drawing/2014/main" id="{DEDEF3C1-168C-4B69-A075-79BF16851756}"/>
+              </a:ext>
+            </a:extLst>
+          </p:cNvPr>
+          <p:cNvCxnSpPr>
+            <a:cxnSpLocks/>
+          </p:cNvCxnSpPr>
+          <p:nvPr/>
+        </p:nvCxnSpPr>
+        <p:spPr>
+          <a:xfrm flipH="1">
+            <a:off x="2616994" y="1398748"/>
+            <a:ext cx="1847850" cy="0"/>
+          </a:xfrm>
+          <a:prstGeom prst="line">
+            <a:avLst/>
+          </a:prstGeom>
+          <a:ln w="28575">
+            <a:solidFill>
+              <a:srgbClr val="0070C0"/>
+            </a:solidFill>
+          </a:ln>
+        </p:spPr>
+        <p:style>
+          <a:lnRef idx="1">
+            <a:schemeClr val="accent1"/>
+          </a:lnRef>
+          <a:fillRef idx="0">
+            <a:schemeClr val="accent1"/>
+          </a:fillRef>
+          <a:effectRef idx="0">
+            <a:schemeClr val="accent1"/>
+          </a:effectRef>
+          <a:fontRef idx="minor">
+            <a:schemeClr val="tx1"/>
+          </a:fontRef>
+        </p:style>
+      </p:cxnSp>
+      <p:sp>
+        <p:nvSpPr>
+          <p:cNvPr id="45" name="Rectangle 44">
+            <a:extLst>
+              <a:ext uri="{FF2B5EF4-FFF2-40B4-BE49-F238E27FC236}">
+                <a16:creationId xmlns:a16="http://schemas.microsoft.com/office/drawing/2014/main" id="{1D9047BE-931B-4F05-BC5C-1C90899755E6}"/>
+              </a:ext>
+            </a:extLst>
+          </p:cNvPr>
+          <p:cNvSpPr/>
+          <p:nvPr/>
+        </p:nvSpPr>
+        <p:spPr>
+          <a:xfrm>
+            <a:off x="2962274" y="1685134"/>
+            <a:ext cx="464345" cy="265108"/>
+          </a:xfrm>
+          <a:prstGeom prst="rect">
+            <a:avLst/>
+          </a:prstGeom>
+          <a:noFill/>
+          <a:ln w="28575">
+            <a:solidFill>
+              <a:srgbClr val="C00000"/>
+            </a:solidFill>
+          </a:ln>
+        </p:spPr>
+        <p:style>
+          <a:lnRef idx="2">
+            <a:schemeClr val="accent1">
+              <a:shade val="50000"/>
+            </a:schemeClr>
+          </a:lnRef>
+          <a:fillRef idx="1">
+            <a:schemeClr val="accent1"/>
+          </a:fillRef>
+          <a:effectRef idx="0">
+            <a:schemeClr val="accent1"/>
+          </a:effectRef>
+          <a:fontRef idx="minor">
+            <a:schemeClr val="lt1"/>
+          </a:fontRef>
+        </p:style>
+        <p:txBody>
+          <a:bodyPr rtlCol="0" anchor="ctr"/>
+          <a:lstStyle/>
+          <a:p>
+            <a:pPr algn="ctr"/>
+            <a:endParaRPr lang="en-US"/>
+          </a:p>
+        </p:txBody>
+      </p:sp>
+      <p:cxnSp>
+        <p:nvCxnSpPr>
+          <p:cNvPr id="47" name="Straight Connector 46">
+            <a:extLst>
+              <a:ext uri="{FF2B5EF4-FFF2-40B4-BE49-F238E27FC236}">
+                <a16:creationId xmlns:a16="http://schemas.microsoft.com/office/drawing/2014/main" id="{67F03AB3-C435-44E4-A5D5-6C45F4259546}"/>
+              </a:ext>
+            </a:extLst>
+          </p:cNvPr>
+          <p:cNvCxnSpPr>
+            <a:cxnSpLocks/>
+            <a:stCxn id="45" idx="3"/>
+          </p:cNvCxnSpPr>
+          <p:nvPr/>
+        </p:nvCxnSpPr>
+        <p:spPr>
+          <a:xfrm>
+            <a:off x="3426619" y="1817688"/>
+            <a:ext cx="583406" cy="0"/>
+          </a:xfrm>
+          <a:prstGeom prst="line">
+            <a:avLst/>
+          </a:prstGeom>
+          <a:ln w="28575">
+            <a:solidFill>
+              <a:srgbClr val="C00000"/>
+            </a:solidFill>
+          </a:ln>
+        </p:spPr>
+        <p:style>
+          <a:lnRef idx="1">
+            <a:schemeClr val="accent1"/>
+          </a:lnRef>
+          <a:fillRef idx="0">
+            <a:schemeClr val="accent1"/>
+          </a:fillRef>
+          <a:effectRef idx="0">
+            <a:schemeClr val="accent1"/>
+          </a:effectRef>
+          <a:fontRef idx="minor">
+            <a:schemeClr val="tx1"/>
+          </a:fontRef>
+        </p:style>
+      </p:cxnSp>
+      <p:cxnSp>
+        <p:nvCxnSpPr>
+          <p:cNvPr id="49" name="Straight Connector 48">
+            <a:extLst>
+              <a:ext uri="{FF2B5EF4-FFF2-40B4-BE49-F238E27FC236}">
+                <a16:creationId xmlns:a16="http://schemas.microsoft.com/office/drawing/2014/main" id="{CF60BED8-C636-4A95-A27B-4E0A598A0413}"/>
+              </a:ext>
+            </a:extLst>
+          </p:cNvPr>
+          <p:cNvCxnSpPr>
+            <a:cxnSpLocks/>
+          </p:cNvCxnSpPr>
+          <p:nvPr/>
+        </p:nvCxnSpPr>
+        <p:spPr>
+          <a:xfrm>
+            <a:off x="4010025" y="1817370"/>
+            <a:ext cx="0" cy="2785586"/>
+          </a:xfrm>
+          <a:prstGeom prst="line">
+            <a:avLst/>
+          </a:prstGeom>
+          <a:ln w="28575">
+            <a:solidFill>
+              <a:srgbClr val="C00000"/>
+            </a:solidFill>
+          </a:ln>
+        </p:spPr>
+        <p:style>
+          <a:lnRef idx="1">
+            <a:schemeClr val="accent1"/>
+          </a:lnRef>
+          <a:fillRef idx="0">
+            <a:schemeClr val="accent1"/>
+          </a:fillRef>
+          <a:effectRef idx="0">
+            <a:schemeClr val="accent1"/>
+          </a:effectRef>
+          <a:fontRef idx="minor">
+            <a:schemeClr val="tx1"/>
+          </a:fontRef>
+        </p:style>
+      </p:cxnSp>
+      <p:cxnSp>
+        <p:nvCxnSpPr>
+          <p:cNvPr id="53" name="Straight Connector 52">
+            <a:extLst>
+              <a:ext uri="{FF2B5EF4-FFF2-40B4-BE49-F238E27FC236}">
+                <a16:creationId xmlns:a16="http://schemas.microsoft.com/office/drawing/2014/main" id="{E7278F57-C617-4E56-AF23-4C6C5BBED347}"/>
+              </a:ext>
+            </a:extLst>
+          </p:cNvPr>
+          <p:cNvCxnSpPr>
+            <a:cxnSpLocks/>
+          </p:cNvCxnSpPr>
+          <p:nvPr/>
+        </p:nvCxnSpPr>
+        <p:spPr>
+          <a:xfrm flipH="1">
+            <a:off x="4010025" y="3138487"/>
+            <a:ext cx="1073150" cy="0"/>
+          </a:xfrm>
+          <a:prstGeom prst="line">
+            <a:avLst/>
+          </a:prstGeom>
+          <a:ln w="28575">
+            <a:solidFill>
+              <a:srgbClr val="C00000"/>
+            </a:solidFill>
+          </a:ln>
+        </p:spPr>
+        <p:style>
+          <a:lnRef idx="1">
+            <a:schemeClr val="accent1"/>
+          </a:lnRef>
+          <a:fillRef idx="0">
+            <a:schemeClr val="accent1"/>
+          </a:fillRef>
+          <a:effectRef idx="0">
+            <a:schemeClr val="accent1"/>
+          </a:effectRef>
+          <a:fontRef idx="minor">
+            <a:schemeClr val="tx1"/>
+          </a:fontRef>
+        </p:style>
+      </p:cxnSp>
+      <p:cxnSp>
+        <p:nvCxnSpPr>
+          <p:cNvPr id="59" name="Straight Connector 58">
+            <a:extLst>
+              <a:ext uri="{FF2B5EF4-FFF2-40B4-BE49-F238E27FC236}">
+                <a16:creationId xmlns:a16="http://schemas.microsoft.com/office/drawing/2014/main" id="{8230B5AD-3D69-474A-91EE-46B536942B84}"/>
+              </a:ext>
+            </a:extLst>
+          </p:cNvPr>
+          <p:cNvCxnSpPr>
+            <a:cxnSpLocks/>
+          </p:cNvCxnSpPr>
+          <p:nvPr/>
+        </p:nvCxnSpPr>
+        <p:spPr>
+          <a:xfrm flipH="1">
+            <a:off x="4010025" y="4602956"/>
+            <a:ext cx="1144021" cy="0"/>
+          </a:xfrm>
+          <a:prstGeom prst="line">
+            <a:avLst/>
+          </a:prstGeom>
+          <a:ln w="28575">
+            <a:solidFill>
+              <a:srgbClr val="C00000"/>
+            </a:solidFill>
+          </a:ln>
+        </p:spPr>
+        <p:style>
+          <a:lnRef idx="1">
+            <a:schemeClr val="accent1"/>
+          </a:lnRef>
+          <a:fillRef idx="0">
+            <a:schemeClr val="accent1"/>
+          </a:fillRef>
+          <a:effectRef idx="0">
+            <a:schemeClr val="accent1"/>
+          </a:effectRef>
+          <a:fontRef idx="minor">
+            <a:schemeClr val="tx1"/>
+          </a:fontRef>
+        </p:style>
+      </p:cxnSp>
+      <p:sp>
+        <p:nvSpPr>
+          <p:cNvPr id="65" name="Rectangle 64">
+            <a:extLst>
+              <a:ext uri="{FF2B5EF4-FFF2-40B4-BE49-F238E27FC236}">
+                <a16:creationId xmlns:a16="http://schemas.microsoft.com/office/drawing/2014/main" id="{B1CD019E-9153-43BD-9CC9-A7506B7B8E7D}"/>
+              </a:ext>
+            </a:extLst>
+          </p:cNvPr>
+          <p:cNvSpPr/>
+          <p:nvPr/>
+        </p:nvSpPr>
+        <p:spPr>
+          <a:xfrm>
+            <a:off x="1278733" y="1650208"/>
+            <a:ext cx="224313" cy="292892"/>
+          </a:xfrm>
+          <a:prstGeom prst="rect">
+            <a:avLst/>
+          </a:prstGeom>
+          <a:noFill/>
+          <a:ln w="28575">
+            <a:solidFill>
+              <a:srgbClr val="C00000"/>
+            </a:solidFill>
+          </a:ln>
+        </p:spPr>
+        <p:style>
+          <a:lnRef idx="2">
+            <a:schemeClr val="accent1">
+              <a:shade val="50000"/>
+            </a:schemeClr>
+          </a:lnRef>
+          <a:fillRef idx="1">
+            <a:schemeClr val="accent1"/>
+          </a:fillRef>
+          <a:effectRef idx="0">
+            <a:schemeClr val="accent1"/>
+          </a:effectRef>
+          <a:fontRef idx="minor">
+            <a:schemeClr val="lt1"/>
+          </a:fontRef>
+        </p:style>
+        <p:txBody>
+          <a:bodyPr rtlCol="0" anchor="ctr"/>
+          <a:lstStyle/>
+          <a:p>
+            <a:pPr algn="ctr"/>
+            <a:endParaRPr lang="en-US"/>
+          </a:p>
+        </p:txBody>
+      </p:sp>
+      <p:cxnSp>
+        <p:nvCxnSpPr>
+          <p:cNvPr id="66" name="Straight Connector 65">
+            <a:extLst>
+              <a:ext uri="{FF2B5EF4-FFF2-40B4-BE49-F238E27FC236}">
+                <a16:creationId xmlns:a16="http://schemas.microsoft.com/office/drawing/2014/main" id="{78AF5BDB-73ED-48C6-8E8B-D288B9141380}"/>
+              </a:ext>
+            </a:extLst>
+          </p:cNvPr>
+          <p:cNvCxnSpPr>
+            <a:cxnSpLocks/>
+          </p:cNvCxnSpPr>
+          <p:nvPr/>
+        </p:nvCxnSpPr>
+        <p:spPr>
+          <a:xfrm flipH="1">
+            <a:off x="1414462" y="1142525"/>
+            <a:ext cx="2324100" cy="0"/>
+          </a:xfrm>
+          <a:prstGeom prst="line">
+            <a:avLst/>
+          </a:prstGeom>
+          <a:ln w="28575">
+            <a:solidFill>
+              <a:srgbClr val="C00000"/>
+            </a:solidFill>
+          </a:ln>
+        </p:spPr>
+        <p:style>
+          <a:lnRef idx="1">
+            <a:schemeClr val="accent1"/>
+          </a:lnRef>
+          <a:fillRef idx="0">
+            <a:schemeClr val="accent1"/>
+          </a:fillRef>
+          <a:effectRef idx="0">
+            <a:schemeClr val="accent1"/>
+          </a:effectRef>
+          <a:fontRef idx="minor">
+            <a:schemeClr val="tx1"/>
+          </a:fontRef>
+        </p:style>
+      </p:cxnSp>
+      <p:cxnSp>
+        <p:nvCxnSpPr>
+          <p:cNvPr id="69" name="Straight Connector 68">
+            <a:extLst>
+              <a:ext uri="{FF2B5EF4-FFF2-40B4-BE49-F238E27FC236}">
+                <a16:creationId xmlns:a16="http://schemas.microsoft.com/office/drawing/2014/main" id="{5255D638-8C21-4169-8D20-B4DB1F27ECC6}"/>
+              </a:ext>
+            </a:extLst>
+          </p:cNvPr>
+          <p:cNvCxnSpPr>
+            <a:cxnSpLocks/>
+          </p:cNvCxnSpPr>
+          <p:nvPr/>
+        </p:nvCxnSpPr>
+        <p:spPr>
+          <a:xfrm>
+            <a:off x="3738562" y="1142525"/>
+            <a:ext cx="0" cy="674845"/>
+          </a:xfrm>
+          <a:prstGeom prst="line">
+            <a:avLst/>
+          </a:prstGeom>
+          <a:ln w="28575">
+            <a:solidFill>
+              <a:srgbClr val="C00000"/>
+            </a:solidFill>
+          </a:ln>
+        </p:spPr>
+        <p:style>
+          <a:lnRef idx="1">
+            <a:schemeClr val="accent1"/>
+          </a:lnRef>
+          <a:fillRef idx="0">
+            <a:schemeClr val="accent1"/>
+          </a:fillRef>
+          <a:effectRef idx="0">
+            <a:schemeClr val="accent1"/>
+          </a:effectRef>
+          <a:fontRef idx="minor">
+            <a:schemeClr val="tx1"/>
+          </a:fontRef>
+        </p:style>
+      </p:cxnSp>
+      <p:cxnSp>
+        <p:nvCxnSpPr>
+          <p:cNvPr id="72" name="Straight Connector 71">
+            <a:extLst>
+              <a:ext uri="{FF2B5EF4-FFF2-40B4-BE49-F238E27FC236}">
+                <a16:creationId xmlns:a16="http://schemas.microsoft.com/office/drawing/2014/main" id="{905FD77C-221C-41B3-97E0-1B6DC4DE9ABC}"/>
+              </a:ext>
+            </a:extLst>
+          </p:cNvPr>
+          <p:cNvCxnSpPr>
+            <a:cxnSpLocks/>
+          </p:cNvCxnSpPr>
+          <p:nvPr/>
+        </p:nvCxnSpPr>
+        <p:spPr>
+          <a:xfrm>
+            <a:off x="1414462" y="1142525"/>
+            <a:ext cx="0" cy="507683"/>
+          </a:xfrm>
+          <a:prstGeom prst="line">
+            <a:avLst/>
+          </a:prstGeom>
+          <a:ln w="28575">
+            <a:solidFill>
+              <a:srgbClr val="C00000"/>
+            </a:solidFill>
+          </a:ln>
+        </p:spPr>
+        <p:style>
+          <a:lnRef idx="1">
+            <a:schemeClr val="accent1"/>
+          </a:lnRef>
+          <a:fillRef idx="0">
+            <a:schemeClr val="accent1"/>
+          </a:fillRef>
+          <a:effectRef idx="0">
+            <a:schemeClr val="accent1"/>
+          </a:effectRef>
+          <a:fontRef idx="minor">
+            <a:schemeClr val="tx1"/>
+          </a:fontRef>
+        </p:style>
+      </p:cxnSp>
     </p:spTree>
     <p:extLst>
       <p:ext uri="{BB962C8B-B14F-4D97-AF65-F5344CB8AC3E}">
@@ -3409,6 +4639,18 @@
   <p:clrMapOvr>
     <a:masterClrMapping/>
   </p:clrMapOvr>
+  <mc:AlternateContent xmlns:mc="http://schemas.openxmlformats.org/markup-compatibility/2006">
+    <mc:Choice xmlns:p14="http://schemas.microsoft.com/office/powerpoint/2010/main" Requires="p14">
+      <p:transition spd="med" p14:dur="700">
+        <p:fade/>
+      </p:transition>
+    </mc:Choice>
+    <mc:Fallback>
+      <p:transition spd="med">
+        <p:fade/>
+      </p:transition>
+    </mc:Fallback>
+  </mc:AlternateContent>
 </p:sld>
 </file>
 
@@ -3462,39 +4704,29 @@
           <a:p>
             <a:r>
               <a:rPr lang="it-IT" dirty="0"/>
-              <a:t>Il menù a tendina mostra gli annunci dell’utente</a:t>
-            </a:r>
-          </a:p>
-          <a:p>
+              <a:t>Da un menù contestuale l’utente sarà in grado di:</a:t>
+            </a:r>
+          </a:p>
+          <a:p>
+            <a:pPr lvl="1"/>
+            <a:r>
+              <a:rPr lang="it-IT" b="1" dirty="0"/>
+              <a:t>Gestire una sua parte personale </a:t>
+            </a:r>
             <a:r>
               <a:rPr lang="it-IT" dirty="0"/>
-              <a:t>La sezione messaggi visualizza eventuali messaggi da altri utenti </a:t>
-            </a:r>
-          </a:p>
-          <a:p>
+              <a:t>(parte superiore del menù) in cui sarà in grado di vedere gli annunci che ha pubblicato, le sue impostazioni, messaggi ricevuti e oggetti/account preferiti </a:t>
+            </a:r>
+          </a:p>
+          <a:p>
+            <a:pPr lvl="1"/>
+            <a:r>
+              <a:rPr lang="it-IT" b="1" dirty="0"/>
+              <a:t>Cercare annunci secondo più categorie </a:t>
+            </a:r>
             <a:r>
               <a:rPr lang="it-IT" dirty="0"/>
-              <a:t>Sarà offerta la possibilità di selezionare dei preferiti e quindi di visualizzarli</a:t>
-            </a:r>
-          </a:p>
-          <a:p>
-            <a:r>
-              <a:rPr lang="it-IT" dirty="0"/>
-              <a:t>Tramite impostazioni è possibile modificare la lingua dell’applicazione e(…)</a:t>
-            </a:r>
-          </a:p>
-          <a:p>
-            <a:r>
-              <a:rPr lang="it-IT" dirty="0"/>
-              <a:t>Sotto la voce categorie sono mostrate diverse opzioni che portano a oggetti di una determinata categoria o a oggetti più gettonati </a:t>
-            </a:r>
-            <a:r>
-              <a:rPr lang="it-IT"/>
-              <a:t>(Chi più </a:t>
-            </a:r>
-            <a:r>
-              <a:rPr lang="it-IT" dirty="0"/>
-              <a:t>ne ha più ne metta)</a:t>
+              <a:t>e sottocategorie, alcune delle quali create ad-hoc per mettere in evidenza, ad esempio, oggetti appetibili per l’utente</a:t>
             </a:r>
           </a:p>
           <a:p>
@@ -3504,10 +4736,10 @@
       </p:sp>
       <p:pic>
         <p:nvPicPr>
-          <p:cNvPr id="7" name="Immagine 6">
+          <p:cNvPr id="4" name="Picture 3">
             <a:extLst>
               <a:ext uri="{FF2B5EF4-FFF2-40B4-BE49-F238E27FC236}">
-                <a16:creationId xmlns:a16="http://schemas.microsoft.com/office/drawing/2014/main" id="{E19E189E-4AED-4749-A89A-B6888B493571}"/>
+                <a16:creationId xmlns:a16="http://schemas.microsoft.com/office/drawing/2014/main" id="{3D6B1C65-CD7F-4A8C-8119-F73A7F2B23DE}"/>
               </a:ext>
             </a:extLst>
           </p:cNvPr>
@@ -3530,14 +4762,410 @@
         </p:blipFill>
         <p:spPr>
           <a:xfrm>
-            <a:off x="208021" y="214462"/>
-            <a:ext cx="3616355" cy="6429076"/>
+            <a:off x="0" y="0"/>
+            <a:ext cx="4632798" cy="6858000"/>
           </a:xfrm>
           <a:prstGeom prst="rect">
             <a:avLst/>
           </a:prstGeom>
         </p:spPr>
       </p:pic>
+      <p:pic>
+        <p:nvPicPr>
+          <p:cNvPr id="7" name="Immagine 6">
+            <a:extLst>
+              <a:ext uri="{FF2B5EF4-FFF2-40B4-BE49-F238E27FC236}">
+                <a16:creationId xmlns:a16="http://schemas.microsoft.com/office/drawing/2014/main" id="{E19E189E-4AED-4749-A89A-B6888B493571}"/>
+              </a:ext>
+            </a:extLst>
+          </p:cNvPr>
+          <p:cNvPicPr>
+            <a:picLocks noChangeAspect="1"/>
+          </p:cNvPicPr>
+          <p:nvPr/>
+        </p:nvPicPr>
+        <p:blipFill>
+          <a:blip r:embed="rId3">
+            <a:extLst>
+              <a:ext uri="{28A0092B-C50C-407E-A947-70E740481C1C}">
+                <a14:useLocalDpi xmlns:a14="http://schemas.microsoft.com/office/drawing/2010/main" val="0"/>
+              </a:ext>
+            </a:extLst>
+          </a:blip>
+          <a:stretch>
+            <a:fillRect/>
+          </a:stretch>
+        </p:blipFill>
+        <p:spPr>
+          <a:xfrm>
+            <a:off x="1255028" y="1504950"/>
+            <a:ext cx="2207277" cy="3924048"/>
+          </a:xfrm>
+          <a:prstGeom prst="rect">
+            <a:avLst/>
+          </a:prstGeom>
+        </p:spPr>
+      </p:pic>
+      <p:sp>
+        <p:nvSpPr>
+          <p:cNvPr id="2" name="Rectangle 1">
+            <a:extLst>
+              <a:ext uri="{FF2B5EF4-FFF2-40B4-BE49-F238E27FC236}">
+                <a16:creationId xmlns:a16="http://schemas.microsoft.com/office/drawing/2014/main" id="{150B1E33-1096-414B-BA22-CB2FBEA90CE9}"/>
+              </a:ext>
+            </a:extLst>
+          </p:cNvPr>
+          <p:cNvSpPr/>
+          <p:nvPr/>
+        </p:nvSpPr>
+        <p:spPr>
+          <a:xfrm>
+            <a:off x="1162050" y="2381250"/>
+            <a:ext cx="1133475" cy="1143000"/>
+          </a:xfrm>
+          <a:prstGeom prst="rect">
+            <a:avLst/>
+          </a:prstGeom>
+          <a:noFill/>
+          <a:ln w="28575">
+            <a:solidFill>
+              <a:srgbClr val="FFC000"/>
+            </a:solidFill>
+          </a:ln>
+        </p:spPr>
+        <p:style>
+          <a:lnRef idx="2">
+            <a:schemeClr val="accent1">
+              <a:shade val="50000"/>
+            </a:schemeClr>
+          </a:lnRef>
+          <a:fillRef idx="1">
+            <a:schemeClr val="accent1"/>
+          </a:fillRef>
+          <a:effectRef idx="0">
+            <a:schemeClr val="accent1"/>
+          </a:effectRef>
+          <a:fontRef idx="minor">
+            <a:schemeClr val="lt1"/>
+          </a:fontRef>
+        </p:style>
+        <p:txBody>
+          <a:bodyPr rtlCol="0" anchor="ctr"/>
+          <a:lstStyle/>
+          <a:p>
+            <a:pPr algn="ctr"/>
+            <a:endParaRPr lang="en-US"/>
+          </a:p>
+        </p:txBody>
+      </p:sp>
+      <p:cxnSp>
+        <p:nvCxnSpPr>
+          <p:cNvPr id="10" name="Straight Connector 9">
+            <a:extLst>
+              <a:ext uri="{FF2B5EF4-FFF2-40B4-BE49-F238E27FC236}">
+                <a16:creationId xmlns:a16="http://schemas.microsoft.com/office/drawing/2014/main" id="{C8D4397A-43DA-452D-A859-E260EF021F0D}"/>
+              </a:ext>
+            </a:extLst>
+          </p:cNvPr>
+          <p:cNvCxnSpPr/>
+          <p:nvPr/>
+        </p:nvCxnSpPr>
+        <p:spPr>
+          <a:xfrm>
+            <a:off x="2295525" y="2762250"/>
+            <a:ext cx="2337273" cy="0"/>
+          </a:xfrm>
+          <a:prstGeom prst="line">
+            <a:avLst/>
+          </a:prstGeom>
+          <a:ln w="28575">
+            <a:solidFill>
+              <a:srgbClr val="FFC000"/>
+            </a:solidFill>
+          </a:ln>
+        </p:spPr>
+        <p:style>
+          <a:lnRef idx="1">
+            <a:schemeClr val="accent1"/>
+          </a:lnRef>
+          <a:fillRef idx="0">
+            <a:schemeClr val="accent1"/>
+          </a:fillRef>
+          <a:effectRef idx="0">
+            <a:schemeClr val="accent1"/>
+          </a:effectRef>
+          <a:fontRef idx="minor">
+            <a:schemeClr val="tx1"/>
+          </a:fontRef>
+        </p:style>
+      </p:cxnSp>
+      <p:cxnSp>
+        <p:nvCxnSpPr>
+          <p:cNvPr id="11" name="Straight Connector 10">
+            <a:extLst>
+              <a:ext uri="{FF2B5EF4-FFF2-40B4-BE49-F238E27FC236}">
+                <a16:creationId xmlns:a16="http://schemas.microsoft.com/office/drawing/2014/main" id="{F199FC54-689D-4E27-8269-9D20D3CA2F66}"/>
+              </a:ext>
+            </a:extLst>
+          </p:cNvPr>
+          <p:cNvCxnSpPr>
+            <a:cxnSpLocks/>
+          </p:cNvCxnSpPr>
+          <p:nvPr/>
+        </p:nvCxnSpPr>
+        <p:spPr>
+          <a:xfrm>
+            <a:off x="4632798" y="1678781"/>
+            <a:ext cx="0" cy="1083469"/>
+          </a:xfrm>
+          <a:prstGeom prst="line">
+            <a:avLst/>
+          </a:prstGeom>
+          <a:ln w="28575">
+            <a:solidFill>
+              <a:srgbClr val="FFC000"/>
+            </a:solidFill>
+          </a:ln>
+        </p:spPr>
+        <p:style>
+          <a:lnRef idx="1">
+            <a:schemeClr val="accent1"/>
+          </a:lnRef>
+          <a:fillRef idx="0">
+            <a:schemeClr val="accent1"/>
+          </a:fillRef>
+          <a:effectRef idx="0">
+            <a:schemeClr val="accent1"/>
+          </a:effectRef>
+          <a:fontRef idx="minor">
+            <a:schemeClr val="tx1"/>
+          </a:fontRef>
+        </p:style>
+      </p:cxnSp>
+      <p:cxnSp>
+        <p:nvCxnSpPr>
+          <p:cNvPr id="14" name="Straight Connector 13">
+            <a:extLst>
+              <a:ext uri="{FF2B5EF4-FFF2-40B4-BE49-F238E27FC236}">
+                <a16:creationId xmlns:a16="http://schemas.microsoft.com/office/drawing/2014/main" id="{24D07AFB-2683-4280-A07B-36F6FA83F252}"/>
+              </a:ext>
+            </a:extLst>
+          </p:cNvPr>
+          <p:cNvCxnSpPr>
+            <a:cxnSpLocks/>
+          </p:cNvCxnSpPr>
+          <p:nvPr/>
+        </p:nvCxnSpPr>
+        <p:spPr>
+          <a:xfrm flipH="1">
+            <a:off x="4632798" y="1678781"/>
+            <a:ext cx="872652" cy="4762"/>
+          </a:xfrm>
+          <a:prstGeom prst="line">
+            <a:avLst/>
+          </a:prstGeom>
+          <a:ln w="28575">
+            <a:solidFill>
+              <a:srgbClr val="FFC000"/>
+            </a:solidFill>
+          </a:ln>
+        </p:spPr>
+        <p:style>
+          <a:lnRef idx="1">
+            <a:schemeClr val="accent1"/>
+          </a:lnRef>
+          <a:fillRef idx="0">
+            <a:schemeClr val="accent1"/>
+          </a:fillRef>
+          <a:effectRef idx="0">
+            <a:schemeClr val="accent1"/>
+          </a:effectRef>
+          <a:fontRef idx="minor">
+            <a:schemeClr val="tx1"/>
+          </a:fontRef>
+        </p:style>
+      </p:cxnSp>
+      <p:sp>
+        <p:nvSpPr>
+          <p:cNvPr id="19" name="Rectangle 18">
+            <a:extLst>
+              <a:ext uri="{FF2B5EF4-FFF2-40B4-BE49-F238E27FC236}">
+                <a16:creationId xmlns:a16="http://schemas.microsoft.com/office/drawing/2014/main" id="{94BDCA74-6D64-4B55-B467-58330E974708}"/>
+              </a:ext>
+            </a:extLst>
+          </p:cNvPr>
+          <p:cNvSpPr/>
+          <p:nvPr/>
+        </p:nvSpPr>
+        <p:spPr>
+          <a:xfrm>
+            <a:off x="1162050" y="3726180"/>
+            <a:ext cx="1367790" cy="1356350"/>
+          </a:xfrm>
+          <a:prstGeom prst="rect">
+            <a:avLst/>
+          </a:prstGeom>
+          <a:noFill/>
+          <a:ln w="28575">
+            <a:solidFill>
+              <a:srgbClr val="0070C0"/>
+            </a:solidFill>
+          </a:ln>
+        </p:spPr>
+        <p:style>
+          <a:lnRef idx="2">
+            <a:schemeClr val="accent1">
+              <a:shade val="50000"/>
+            </a:schemeClr>
+          </a:lnRef>
+          <a:fillRef idx="1">
+            <a:schemeClr val="accent1"/>
+          </a:fillRef>
+          <a:effectRef idx="0">
+            <a:schemeClr val="accent1"/>
+          </a:effectRef>
+          <a:fontRef idx="minor">
+            <a:schemeClr val="lt1"/>
+          </a:fontRef>
+        </p:style>
+        <p:txBody>
+          <a:bodyPr rtlCol="0" anchor="ctr"/>
+          <a:lstStyle/>
+          <a:p>
+            <a:pPr algn="ctr"/>
+            <a:endParaRPr lang="en-US"/>
+          </a:p>
+        </p:txBody>
+      </p:sp>
+      <p:cxnSp>
+        <p:nvCxnSpPr>
+          <p:cNvPr id="20" name="Straight Connector 19">
+            <a:extLst>
+              <a:ext uri="{FF2B5EF4-FFF2-40B4-BE49-F238E27FC236}">
+                <a16:creationId xmlns:a16="http://schemas.microsoft.com/office/drawing/2014/main" id="{57970687-E548-4D60-9872-6ACAF96909BA}"/>
+              </a:ext>
+            </a:extLst>
+          </p:cNvPr>
+          <p:cNvCxnSpPr>
+            <a:cxnSpLocks/>
+          </p:cNvCxnSpPr>
+          <p:nvPr/>
+        </p:nvCxnSpPr>
+        <p:spPr>
+          <a:xfrm>
+            <a:off x="2529840" y="4171950"/>
+            <a:ext cx="2786094" cy="0"/>
+          </a:xfrm>
+          <a:prstGeom prst="line">
+            <a:avLst/>
+          </a:prstGeom>
+          <a:ln w="28575">
+            <a:solidFill>
+              <a:srgbClr val="0070C0"/>
+            </a:solidFill>
+          </a:ln>
+        </p:spPr>
+        <p:style>
+          <a:lnRef idx="1">
+            <a:schemeClr val="accent1"/>
+          </a:lnRef>
+          <a:fillRef idx="0">
+            <a:schemeClr val="accent1"/>
+          </a:fillRef>
+          <a:effectRef idx="0">
+            <a:schemeClr val="accent1"/>
+          </a:effectRef>
+          <a:fontRef idx="minor">
+            <a:schemeClr val="tx1"/>
+          </a:fontRef>
+        </p:style>
+      </p:cxnSp>
+      <p:cxnSp>
+        <p:nvCxnSpPr>
+          <p:cNvPr id="22" name="Straight Connector 21">
+            <a:extLst>
+              <a:ext uri="{FF2B5EF4-FFF2-40B4-BE49-F238E27FC236}">
+                <a16:creationId xmlns:a16="http://schemas.microsoft.com/office/drawing/2014/main" id="{5BB72653-37F4-4B55-B8AB-1ECC2BE45E8D}"/>
+              </a:ext>
+            </a:extLst>
+          </p:cNvPr>
+          <p:cNvCxnSpPr>
+            <a:cxnSpLocks/>
+          </p:cNvCxnSpPr>
+          <p:nvPr/>
+        </p:nvCxnSpPr>
+        <p:spPr>
+          <a:xfrm>
+            <a:off x="5315931" y="3387726"/>
+            <a:ext cx="2" cy="784224"/>
+          </a:xfrm>
+          <a:prstGeom prst="line">
+            <a:avLst/>
+          </a:prstGeom>
+          <a:ln w="28575">
+            <a:solidFill>
+              <a:srgbClr val="0070C0"/>
+            </a:solidFill>
+          </a:ln>
+        </p:spPr>
+        <p:style>
+          <a:lnRef idx="1">
+            <a:schemeClr val="accent1"/>
+          </a:lnRef>
+          <a:fillRef idx="0">
+            <a:schemeClr val="accent1"/>
+          </a:fillRef>
+          <a:effectRef idx="0">
+            <a:schemeClr val="accent1"/>
+          </a:effectRef>
+          <a:fontRef idx="minor">
+            <a:schemeClr val="tx1"/>
+          </a:fontRef>
+        </p:style>
+      </p:cxnSp>
+      <p:cxnSp>
+        <p:nvCxnSpPr>
+          <p:cNvPr id="32" name="Straight Connector 31">
+            <a:extLst>
+              <a:ext uri="{FF2B5EF4-FFF2-40B4-BE49-F238E27FC236}">
+                <a16:creationId xmlns:a16="http://schemas.microsoft.com/office/drawing/2014/main" id="{D8EB02B8-2146-481B-9669-62D408E78189}"/>
+              </a:ext>
+            </a:extLst>
+          </p:cNvPr>
+          <p:cNvCxnSpPr>
+            <a:cxnSpLocks/>
+          </p:cNvCxnSpPr>
+          <p:nvPr/>
+        </p:nvCxnSpPr>
+        <p:spPr>
+          <a:xfrm>
+            <a:off x="5315931" y="3387726"/>
+            <a:ext cx="189519" cy="0"/>
+          </a:xfrm>
+          <a:prstGeom prst="line">
+            <a:avLst/>
+          </a:prstGeom>
+          <a:ln w="28575">
+            <a:solidFill>
+              <a:srgbClr val="0070C0"/>
+            </a:solidFill>
+          </a:ln>
+        </p:spPr>
+        <p:style>
+          <a:lnRef idx="1">
+            <a:schemeClr val="accent1"/>
+          </a:lnRef>
+          <a:fillRef idx="0">
+            <a:schemeClr val="accent1"/>
+          </a:fillRef>
+          <a:effectRef idx="0">
+            <a:schemeClr val="accent1"/>
+          </a:effectRef>
+          <a:fontRef idx="minor">
+            <a:schemeClr val="tx1"/>
+          </a:fontRef>
+        </p:style>
+      </p:cxnSp>
     </p:spTree>
     <p:extLst>
       <p:ext uri="{BB962C8B-B14F-4D97-AF65-F5344CB8AC3E}">
@@ -3548,6 +5176,18 @@
   <p:clrMapOvr>
     <a:masterClrMapping/>
   </p:clrMapOvr>
+  <mc:AlternateContent xmlns:mc="http://schemas.openxmlformats.org/markup-compatibility/2006">
+    <mc:Choice xmlns:p14="http://schemas.microsoft.com/office/powerpoint/2010/main" Requires="p14">
+      <p:transition spd="med" p14:dur="700">
+        <p:fade/>
+      </p:transition>
+    </mc:Choice>
+    <mc:Fallback>
+      <p:transition spd="med">
+        <p:fade/>
+      </p:transition>
+    </mc:Fallback>
+  </mc:AlternateContent>
 </p:sld>
 </file>
 
@@ -3568,71 +5208,133 @@
           <a:chExt cx="0" cy="0"/>
         </a:xfrm>
       </p:grpSpPr>
-      <p:sp>
-        <p:nvSpPr>
-          <p:cNvPr id="2" name="Titolo 1">
+      <p:pic>
+        <p:nvPicPr>
+          <p:cNvPr id="4" name="Picture 3">
             <a:extLst>
               <a:ext uri="{FF2B5EF4-FFF2-40B4-BE49-F238E27FC236}">
-                <a16:creationId xmlns:a16="http://schemas.microsoft.com/office/drawing/2014/main" id="{88D7A1B2-DE10-4613-A2FE-5E0757FF8E15}"/>
+                <a16:creationId xmlns:a16="http://schemas.microsoft.com/office/drawing/2014/main" id="{0913CABE-E768-45B1-88C4-82CD6A9F3664}"/>
               </a:ext>
             </a:extLst>
           </p:cNvPr>
-          <p:cNvSpPr>
-            <a:spLocks noGrp="1"/>
-          </p:cNvSpPr>
-          <p:nvPr>
-            <p:ph type="title"/>
-          </p:nvPr>
-        </p:nvSpPr>
-        <p:spPr>
-          <a:xfrm>
-            <a:off x="1044677" y="1522874"/>
-            <a:ext cx="4095135" cy="3594817"/>
-          </a:xfrm>
-        </p:spPr>
-        <p:txBody>
-          <a:bodyPr/>
-          <a:lstStyle/>
-          <a:p>
-            <a:r>
-              <a:rPr lang="it-IT" dirty="0"/>
-              <a:t>Immagine di categoria</a:t>
-            </a:r>
-          </a:p>
-        </p:txBody>
-      </p:sp>
-      <p:sp>
-        <p:nvSpPr>
-          <p:cNvPr id="3" name="Segnaposto contenuto 2">
+          <p:cNvPicPr>
+            <a:picLocks noChangeAspect="1"/>
+          </p:cNvPicPr>
+          <p:nvPr/>
+        </p:nvPicPr>
+        <p:blipFill>
+          <a:blip r:embed="rId2">
+            <a:extLst>
+              <a:ext uri="{28A0092B-C50C-407E-A947-70E740481C1C}">
+                <a14:useLocalDpi xmlns:a14="http://schemas.microsoft.com/office/drawing/2010/main" val="0"/>
+              </a:ext>
+            </a:extLst>
+          </a:blip>
+          <a:stretch>
+            <a:fillRect/>
+          </a:stretch>
+        </p:blipFill>
+        <p:spPr>
+          <a:xfrm>
+            <a:off x="0" y="0"/>
+            <a:ext cx="4632798" cy="6858000"/>
+          </a:xfrm>
+          <a:prstGeom prst="rect">
+            <a:avLst/>
+          </a:prstGeom>
+        </p:spPr>
+      </p:pic>
+      <p:pic>
+        <p:nvPicPr>
+          <p:cNvPr id="11" name="Picture 10">
             <a:extLst>
               <a:ext uri="{FF2B5EF4-FFF2-40B4-BE49-F238E27FC236}">
-                <a16:creationId xmlns:a16="http://schemas.microsoft.com/office/drawing/2014/main" id="{C93EBAAA-8E3F-4BEE-87A6-7B41AD791F17}"/>
+                <a16:creationId xmlns:a16="http://schemas.microsoft.com/office/drawing/2014/main" id="{EAA2C96B-20AE-4845-946B-28B518A426EB}"/>
               </a:ext>
             </a:extLst>
           </p:cNvPr>
-          <p:cNvSpPr>
-            <a:spLocks noGrp="1"/>
-          </p:cNvSpPr>
-          <p:nvPr>
-            <p:ph idx="1"/>
-          </p:nvPr>
-        </p:nvSpPr>
-        <p:spPr>
-          <a:xfrm>
-            <a:off x="6909618" y="1825625"/>
-            <a:ext cx="4444181" cy="2311298"/>
-          </a:xfrm>
-        </p:spPr>
-        <p:txBody>
-          <a:bodyPr/>
-          <a:lstStyle/>
-          <a:p>
-            <a:pPr marL="0" indent="0">
-              <a:buNone/>
+          <p:cNvPicPr>
+            <a:picLocks noChangeAspect="1"/>
+          </p:cNvPicPr>
+          <p:nvPr/>
+        </p:nvPicPr>
+        <p:blipFill>
+          <a:blip r:embed="rId3">
+            <a:extLst>
+              <a:ext uri="{28A0092B-C50C-407E-A947-70E740481C1C}">
+                <a14:useLocalDpi xmlns:a14="http://schemas.microsoft.com/office/drawing/2010/main" val="0"/>
+              </a:ext>
+            </a:extLst>
+          </a:blip>
+          <a:stretch>
+            <a:fillRect/>
+          </a:stretch>
+        </p:blipFill>
+        <p:spPr>
+          <a:xfrm>
+            <a:off x="1252505" y="1507330"/>
+            <a:ext cx="2203315" cy="3917005"/>
+          </a:xfrm>
+          <a:prstGeom prst="rect">
+            <a:avLst/>
+          </a:prstGeom>
+        </p:spPr>
+      </p:pic>
+      <p:sp>
+        <p:nvSpPr>
+          <p:cNvPr id="15" name="TextBox 14">
+            <a:extLst>
+              <a:ext uri="{FF2B5EF4-FFF2-40B4-BE49-F238E27FC236}">
+                <a16:creationId xmlns:a16="http://schemas.microsoft.com/office/drawing/2014/main" id="{CA808AEF-17B7-4845-A7AA-50C9FAF14049}"/>
+              </a:ext>
+            </a:extLst>
+          </p:cNvPr>
+          <p:cNvSpPr txBox="1"/>
+          <p:nvPr/>
+        </p:nvSpPr>
+        <p:spPr>
+          <a:xfrm>
+            <a:off x="5885303" y="1276497"/>
+            <a:ext cx="5772150" cy="461665"/>
+          </a:xfrm>
+          <a:prstGeom prst="rect">
+            <a:avLst/>
+          </a:prstGeom>
+          <a:noFill/>
+        </p:spPr>
+        <p:txBody>
+          <a:bodyPr wrap="square" rtlCol="0">
+            <a:spAutoFit/>
+          </a:bodyPr>
+          <a:lstStyle/>
+          <a:p>
+            <a:pPr marL="342900" indent="-342900">
+              <a:buFont typeface="Arial" panose="020B0604020202020204" pitchFamily="34" charset="0"/>
+              <a:buChar char="•"/>
             </a:pPr>
             <a:r>
-              <a:rPr lang="it-IT" dirty="0"/>
-              <a:t>Ricerca tramite categoria</a:t>
+              <a:rPr lang="en-US" sz="2400" dirty="0" err="1"/>
+              <a:t>Inserire</a:t>
+            </a:r>
+            <a:r>
+              <a:rPr lang="en-US" sz="2400" dirty="0"/>
+              <a:t> </a:t>
+            </a:r>
+            <a:r>
+              <a:rPr lang="en-US" sz="2400" dirty="0" err="1"/>
+              <a:t>il</a:t>
+            </a:r>
+            <a:r>
+              <a:rPr lang="en-US" sz="2400" dirty="0"/>
+              <a:t> </a:t>
+            </a:r>
+            <a:r>
+              <a:rPr lang="en-US" sz="2400" dirty="0" err="1"/>
+              <a:t>testo</a:t>
+            </a:r>
+            <a:r>
+              <a:rPr lang="en-US" sz="2400" dirty="0"/>
+              <a:t> qui </a:t>
             </a:r>
           </a:p>
         </p:txBody>
@@ -3647,6 +5349,18 @@
   <p:clrMapOvr>
     <a:masterClrMapping/>
   </p:clrMapOvr>
+  <mc:AlternateContent xmlns:mc="http://schemas.openxmlformats.org/markup-compatibility/2006">
+    <mc:Choice xmlns:p14="http://schemas.microsoft.com/office/powerpoint/2010/main" Requires="p14">
+      <p:transition spd="med" p14:dur="700">
+        <p:fade/>
+      </p:transition>
+    </mc:Choice>
+    <mc:Fallback>
+      <p:transition spd="med">
+        <p:fade/>
+      </p:transition>
+    </mc:Fallback>
+  </mc:AlternateContent>
 </p:sld>
 </file>
 

</xml_diff>